<commit_message>
this is 0.97 :-)
</commit_message>
<xml_diff>
--- a/resources/docs/web2native-bridge.pptx
+++ b/resources/docs/web2native-bridge.pptx
@@ -3283,19 +3283,8 @@
                 <a:latin typeface="Arial" panose="020B0604020202020204" pitchFamily="34" charset="0"/>
                 <a:cs typeface="Arial" panose="020B0604020202020204" pitchFamily="34" charset="0"/>
               </a:rPr>
-              <a:t>, WebPKI.org, </a:t>
-            </a:r>
-            <a:r>
-              <a:rPr lang="en-US" sz="600" baseline="0" dirty="0" smtClean="0">
-                <a:latin typeface="Arial" panose="020B0604020202020204" pitchFamily="34" charset="0"/>
-                <a:cs typeface="Arial" panose="020B0604020202020204" pitchFamily="34" charset="0"/>
-              </a:rPr>
-              <a:t>V0.97, 2015-03-30</a:t>
-            </a:r>
-            <a:endParaRPr lang="en-US" sz="600" baseline="0" dirty="0" smtClean="0">
-              <a:latin typeface="Arial" panose="020B0604020202020204" pitchFamily="34" charset="0"/>
-              <a:cs typeface="Arial" panose="020B0604020202020204" pitchFamily="34" charset="0"/>
-            </a:endParaRPr>
+              <a:t>, WebPKI.org, V0.97, 2015-03-30</a:t>
+            </a:r>
           </a:p>
         </p:txBody>
       </p:sp>
@@ -3377,21 +3366,7 @@
                 <a:latin typeface="Arial" panose="020B0604020202020204" pitchFamily="34" charset="0"/>
                 <a:cs typeface="Arial" panose="020B0604020202020204" pitchFamily="34" charset="0"/>
               </a:rPr>
-              <a:t>Web2Native Bridge (Public Domain </a:t>
-            </a:r>
-            <a:r>
-              <a:rPr lang="en-US" sz="600" dirty="0" smtClean="0">
-                <a:latin typeface="Arial" panose="020B0604020202020204" pitchFamily="34" charset="0"/>
-                <a:cs typeface="Arial" panose="020B0604020202020204" pitchFamily="34" charset="0"/>
-              </a:rPr>
-              <a:t>Functional Specification</a:t>
-            </a:r>
-            <a:r>
-              <a:rPr lang="en-US" sz="600" dirty="0" smtClean="0">
-                <a:latin typeface="Arial" panose="020B0604020202020204" pitchFamily="34" charset="0"/>
-                <a:cs typeface="Arial" panose="020B0604020202020204" pitchFamily="34" charset="0"/>
-              </a:rPr>
-              <a:t>)</a:t>
+              <a:t>Web2Native Bridge (Public Domain Functional Specification)</a:t>
             </a:r>
             <a:endParaRPr lang="en-US" sz="600" dirty="0">
               <a:latin typeface="Arial" panose="020B0604020202020204" pitchFamily="34" charset="0"/>
@@ -5708,21 +5683,7 @@
                 <a:latin typeface="Arial" panose="020B0604020202020204" pitchFamily="34" charset="0"/>
                 <a:cs typeface="Arial" panose="020B0604020202020204" pitchFamily="34" charset="0"/>
               </a:rPr>
-              <a:t>A </a:t>
-            </a:r>
-            <a:r>
-              <a:rPr lang="en-US" sz="1000" dirty="0" smtClean="0">
-                <a:latin typeface="Arial" panose="020B0604020202020204" pitchFamily="34" charset="0"/>
-                <a:cs typeface="Arial" panose="020B0604020202020204" pitchFamily="34" charset="0"/>
-              </a:rPr>
-              <a:t>web-application </a:t>
-            </a:r>
-            <a:r>
-              <a:rPr lang="en-US" sz="1000" dirty="0" smtClean="0">
-                <a:latin typeface="Arial" panose="020B0604020202020204" pitchFamily="34" charset="0"/>
-                <a:cs typeface="Arial" panose="020B0604020202020204" pitchFamily="34" charset="0"/>
-              </a:rPr>
-              <a:t>wants to connect to a secure element.  Since a browser does not “understand” APDU it can only offer a primitive security prompt.</a:t>
+              <a:t>A web-application wants to connect to a secure element.  Since a browser does not “understand” APDU it can only offer a primitive security prompt.</a:t>
             </a:r>
           </a:p>
         </p:txBody>
@@ -8033,7 +7994,7 @@
                 <a:latin typeface="Arial" panose="020B0604020202020204" pitchFamily="34" charset="0"/>
                 <a:cs typeface="Arial" panose="020B0604020202020204" pitchFamily="34" charset="0"/>
               </a:rPr>
-              <a:t>ocation” but quite unsuitable for a large class of sensitive system APIs and associated user data which in the native world always are dealt with as a part of a packaged application.  The next page outlines a possible way to “emulate” this functionality </a:t>
+              <a:t>ocation” but quite unsuitable for a large class of sensitive system APIs and associated user data which in the native world always are dealt with as a part of a packaged application.  The next page outlines a possible way to “emulate” this functionality in the Open Web. </a:t>
             </a:r>
             <a:r>
               <a:rPr lang="en-US" sz="1200" dirty="0" smtClean="0">
@@ -8043,7 +8004,7 @@
                 <a:latin typeface="Arial" panose="020B0604020202020204" pitchFamily="34" charset="0"/>
                 <a:cs typeface="Arial" panose="020B0604020202020204" pitchFamily="34" charset="0"/>
               </a:rPr>
-              <a:t>in </a:t>
+              <a:t>  </a:t>
             </a:r>
             <a:r>
               <a:rPr lang="en-US" sz="1200" dirty="0" smtClean="0">
@@ -8053,8 +8014,25 @@
                 <a:latin typeface="Arial" panose="020B0604020202020204" pitchFamily="34" charset="0"/>
                 <a:cs typeface="Arial" panose="020B0604020202020204" pitchFamily="34" charset="0"/>
               </a:rPr>
-              <a:t>the Open Web.   The primary advantages would be:</a:t>
-            </a:r>
+              <a:t>The primary </a:t>
+            </a:r>
+            <a:r>
+              <a:rPr lang="en-US" sz="1200" dirty="0" smtClean="0">
+                <a:solidFill>
+                  <a:schemeClr val="tx1"/>
+                </a:solidFill>
+                <a:latin typeface="Arial" panose="020B0604020202020204" pitchFamily="34" charset="0"/>
+                <a:cs typeface="Arial" panose="020B0604020202020204" pitchFamily="34" charset="0"/>
+              </a:rPr>
+              <a:t>goals are:</a:t>
+            </a:r>
+            <a:endParaRPr lang="en-US" sz="1200" dirty="0" smtClean="0">
+              <a:solidFill>
+                <a:schemeClr val="tx1"/>
+              </a:solidFill>
+              <a:latin typeface="Arial" panose="020B0604020202020204" pitchFamily="34" charset="0"/>
+              <a:cs typeface="Arial" panose="020B0604020202020204" pitchFamily="34" charset="0"/>
+            </a:endParaRPr>
           </a:p>
           <a:p>
             <a:pPr marL="171450" indent="-171450">
@@ -8065,16 +8043,6 @@
               <a:buChar char="•"/>
             </a:pPr>
             <a:r>
-              <a:rPr lang="en-US" sz="1200" dirty="0">
-                <a:solidFill>
-                  <a:schemeClr val="tx1"/>
-                </a:solidFill>
-                <a:latin typeface="Arial" panose="020B0604020202020204" pitchFamily="34" charset="0"/>
-                <a:cs typeface="Arial" panose="020B0604020202020204" pitchFamily="34" charset="0"/>
-              </a:rPr>
-              <a:t>L</a:t>
-            </a:r>
-            <a:r>
               <a:rPr lang="en-US" sz="1200" dirty="0" smtClean="0">
                 <a:solidFill>
                   <a:schemeClr val="tx1"/>
@@ -8082,7 +8050,7 @@
                 <a:latin typeface="Arial" panose="020B0604020202020204" pitchFamily="34" charset="0"/>
                 <a:cs typeface="Arial" panose="020B0604020202020204" pitchFamily="34" charset="0"/>
               </a:rPr>
-              <a:t>imit direct access to sensitive </a:t>
+              <a:t>Limiting </a:t>
             </a:r>
             <a:r>
               <a:rPr lang="en-US" sz="1200" dirty="0" smtClean="0">
@@ -8092,7 +8060,7 @@
                 <a:latin typeface="Arial" panose="020B0604020202020204" pitchFamily="34" charset="0"/>
                 <a:cs typeface="Arial" panose="020B0604020202020204" pitchFamily="34" charset="0"/>
               </a:rPr>
-              <a:t>APIs </a:t>
+              <a:t>direct access to sensitive APIs </a:t>
             </a:r>
             <a:r>
               <a:rPr lang="en-US" sz="1200" i="1" dirty="0" smtClean="0">
@@ -8104,13 +8072,6 @@
               </a:rPr>
               <a:t>by untrusted web-code</a:t>
             </a:r>
-            <a:endParaRPr lang="en-US" sz="1200" i="1" dirty="0" smtClean="0">
-              <a:solidFill>
-                <a:schemeClr val="tx1"/>
-              </a:solidFill>
-              <a:latin typeface="Arial" panose="020B0604020202020204" pitchFamily="34" charset="0"/>
-              <a:cs typeface="Arial" panose="020B0604020202020204" pitchFamily="34" charset="0"/>
-            </a:endParaRPr>
           </a:p>
           <a:p>
             <a:pPr marL="171450" indent="-171450">
@@ -8128,7 +8089,7 @@
                 <a:latin typeface="Arial" panose="020B0604020202020204" pitchFamily="34" charset="0"/>
                 <a:cs typeface="Arial" panose="020B0604020202020204" pitchFamily="34" charset="0"/>
               </a:rPr>
-              <a:t>High-level </a:t>
+              <a:t>Supporting high-level </a:t>
             </a:r>
             <a:r>
               <a:rPr lang="en-US" sz="1200" i="1" dirty="0" smtClean="0">
@@ -8148,7 +8109,27 @@
                 <a:latin typeface="Arial" panose="020B0604020202020204" pitchFamily="34" charset="0"/>
                 <a:cs typeface="Arial" panose="020B0604020202020204" pitchFamily="34" charset="0"/>
               </a:rPr>
-              <a:t> schemes make applications less dependent on variations in platform APIs and architectures</a:t>
+              <a:t> schemes </a:t>
+            </a:r>
+            <a:r>
+              <a:rPr lang="en-US" sz="1200" dirty="0" smtClean="0">
+                <a:solidFill>
+                  <a:schemeClr val="tx1"/>
+                </a:solidFill>
+                <a:latin typeface="Arial" panose="020B0604020202020204" pitchFamily="34" charset="0"/>
+                <a:cs typeface="Arial" panose="020B0604020202020204" pitchFamily="34" charset="0"/>
+              </a:rPr>
+              <a:t>to make </a:t>
+            </a:r>
+            <a:r>
+              <a:rPr lang="en-US" sz="1200" dirty="0" smtClean="0">
+                <a:solidFill>
+                  <a:schemeClr val="tx1"/>
+                </a:solidFill>
+                <a:latin typeface="Arial" panose="020B0604020202020204" pitchFamily="34" charset="0"/>
+                <a:cs typeface="Arial" panose="020B0604020202020204" pitchFamily="34" charset="0"/>
+              </a:rPr>
+              <a:t>applications less dependent on variations in platform APIs and architectures</a:t>
             </a:r>
           </a:p>
           <a:p>
@@ -8167,7 +8148,7 @@
                 <a:latin typeface="Arial" panose="020B0604020202020204" pitchFamily="34" charset="0"/>
                 <a:cs typeface="Arial" panose="020B0604020202020204" pitchFamily="34" charset="0"/>
               </a:rPr>
-              <a:t>Provide </a:t>
+              <a:t>Providing </a:t>
             </a:r>
             <a:r>
               <a:rPr lang="en-US" sz="1200" i="1" dirty="0" smtClean="0">
@@ -8445,14 +8426,21 @@
                 <a:latin typeface="Arial" panose="020B0604020202020204" pitchFamily="34" charset="0"/>
                 <a:cs typeface="Arial" panose="020B0604020202020204" pitchFamily="34" charset="0"/>
               </a:rPr>
-              <a:t>service-oriented interfaces </a:t>
+              <a:t>service-oriented</a:t>
             </a:r>
             <a:r>
               <a:rPr lang="en-US" sz="1000" dirty="0" smtClean="0">
                 <a:latin typeface="Arial" panose="020B0604020202020204" pitchFamily="34" charset="0"/>
                 <a:cs typeface="Arial" panose="020B0604020202020204" pitchFamily="34" charset="0"/>
               </a:rPr>
-              <a:t>like shown above minimizes the need for annoying users with difficult security prompts.</a:t>
+              <a:t> applications like </a:t>
+            </a:r>
+            <a:r>
+              <a:rPr lang="en-US" sz="1000" dirty="0" smtClean="0">
+                <a:latin typeface="Arial" panose="020B0604020202020204" pitchFamily="34" charset="0"/>
+                <a:cs typeface="Arial" panose="020B0604020202020204" pitchFamily="34" charset="0"/>
+              </a:rPr>
+              <a:t>shown above minimizes the need for annoying users with difficult security prompts.</a:t>
             </a:r>
           </a:p>
           <a:p>

</xml_diff>

<commit_message>
Colored buttons - What an innovation, Meh
</commit_message>
<xml_diff>
--- a/resources/docs/web2native-bridge.pptx
+++ b/resources/docs/web2native-bridge.pptx
@@ -199,7 +199,7 @@
           <a:p>
             <a:fld id="{07A00844-99C3-4B4D-8665-83D6466F1606}" type="datetimeFigureOut">
               <a:rPr lang="en-US" smtClean="0"/>
-              <a:t>2015-04-18</a:t>
+              <a:t>2015-04-21</a:t>
             </a:fld>
             <a:endParaRPr lang="en-US"/>
           </a:p>
@@ -477,7 +477,7 @@
           <a:p>
             <a:fld id="{A1FD92F6-7B59-47F7-9C80-4F94E0E83D60}" type="datetimeFigureOut">
               <a:rPr lang="en-US" smtClean="0"/>
-              <a:t>2015-04-18</a:t>
+              <a:t>2015-04-21</a:t>
             </a:fld>
             <a:endParaRPr lang="en-US"/>
           </a:p>
@@ -694,7 +694,7 @@
           <a:p>
             <a:fld id="{A1FD92F6-7B59-47F7-9C80-4F94E0E83D60}" type="datetimeFigureOut">
               <a:rPr lang="en-US" smtClean="0"/>
-              <a:t>2015-04-18</a:t>
+              <a:t>2015-04-21</a:t>
             </a:fld>
             <a:endParaRPr lang="en-US"/>
           </a:p>
@@ -904,7 +904,7 @@
           <a:p>
             <a:fld id="{A1FD92F6-7B59-47F7-9C80-4F94E0E83D60}" type="datetimeFigureOut">
               <a:rPr lang="en-US" smtClean="0"/>
-              <a:t>2015-04-18</a:t>
+              <a:t>2015-04-21</a:t>
             </a:fld>
             <a:endParaRPr lang="en-US"/>
           </a:p>
@@ -1189,7 +1189,7 @@
           <a:p>
             <a:fld id="{A1FD92F6-7B59-47F7-9C80-4F94E0E83D60}" type="datetimeFigureOut">
               <a:rPr lang="en-US" smtClean="0"/>
-              <a:t>2015-04-18</a:t>
+              <a:t>2015-04-21</a:t>
             </a:fld>
             <a:endParaRPr lang="en-US"/>
           </a:p>
@@ -1472,7 +1472,7 @@
           <a:p>
             <a:fld id="{A1FD92F6-7B59-47F7-9C80-4F94E0E83D60}" type="datetimeFigureOut">
               <a:rPr lang="en-US" smtClean="0"/>
-              <a:t>2015-04-18</a:t>
+              <a:t>2015-04-21</a:t>
             </a:fld>
             <a:endParaRPr lang="en-US"/>
           </a:p>
@@ -1805,7 +1805,7 @@
           <a:p>
             <a:fld id="{A1FD92F6-7B59-47F7-9C80-4F94E0E83D60}" type="datetimeFigureOut">
               <a:rPr lang="en-US" smtClean="0"/>
-              <a:t>2015-04-18</a:t>
+              <a:t>2015-04-21</a:t>
             </a:fld>
             <a:endParaRPr lang="en-US"/>
           </a:p>
@@ -2271,7 +2271,7 @@
           <a:p>
             <a:fld id="{A1FD92F6-7B59-47F7-9C80-4F94E0E83D60}" type="datetimeFigureOut">
               <a:rPr lang="en-US" smtClean="0"/>
-              <a:t>2015-04-18</a:t>
+              <a:t>2015-04-21</a:t>
             </a:fld>
             <a:endParaRPr lang="en-US"/>
           </a:p>
@@ -2421,7 +2421,7 @@
           <a:p>
             <a:fld id="{A1FD92F6-7B59-47F7-9C80-4F94E0E83D60}" type="datetimeFigureOut">
               <a:rPr lang="en-US" smtClean="0"/>
-              <a:t>2015-04-18</a:t>
+              <a:t>2015-04-21</a:t>
             </a:fld>
             <a:endParaRPr lang="en-US"/>
           </a:p>
@@ -2540,7 +2540,7 @@
           <a:p>
             <a:fld id="{A1FD92F6-7B59-47F7-9C80-4F94E0E83D60}" type="datetimeFigureOut">
               <a:rPr lang="en-US" smtClean="0"/>
-              <a:t>2015-04-18</a:t>
+              <a:t>2015-04-21</a:t>
             </a:fld>
             <a:endParaRPr lang="en-US"/>
           </a:p>
@@ -2850,7 +2850,7 @@
           <a:p>
             <a:fld id="{A1FD92F6-7B59-47F7-9C80-4F94E0E83D60}" type="datetimeFigureOut">
               <a:rPr lang="en-US" smtClean="0"/>
-              <a:t>2015-04-18</a:t>
+              <a:t>2015-04-21</a:t>
             </a:fld>
             <a:endParaRPr lang="en-US"/>
           </a:p>
@@ -3136,7 +3136,7 @@
           <a:p>
             <a:fld id="{A1FD92F6-7B59-47F7-9C80-4F94E0E83D60}" type="datetimeFigureOut">
               <a:rPr lang="en-US" smtClean="0"/>
-              <a:t>2015-04-18</a:t>
+              <a:t>2015-04-21</a:t>
             </a:fld>
             <a:endParaRPr lang="en-US"/>
           </a:p>
@@ -3283,19 +3283,8 @@
                 <a:latin typeface="Arial" panose="020B0604020202020204" pitchFamily="34" charset="0"/>
                 <a:cs typeface="Arial" panose="020B0604020202020204" pitchFamily="34" charset="0"/>
               </a:rPr>
-              <a:t>, WebPKI.org, </a:t>
-            </a:r>
-            <a:r>
-              <a:rPr lang="en-US" sz="600" baseline="0" dirty="0" smtClean="0">
-                <a:latin typeface="Arial" panose="020B0604020202020204" pitchFamily="34" charset="0"/>
-                <a:cs typeface="Arial" panose="020B0604020202020204" pitchFamily="34" charset="0"/>
-              </a:rPr>
-              <a:t>V0.98, 2015-04-18</a:t>
-            </a:r>
-            <a:endParaRPr lang="en-US" sz="600" baseline="0" dirty="0" smtClean="0">
-              <a:latin typeface="Arial" panose="020B0604020202020204" pitchFamily="34" charset="0"/>
-              <a:cs typeface="Arial" panose="020B0604020202020204" pitchFamily="34" charset="0"/>
-            </a:endParaRPr>
+              <a:t>, WebPKI.org, V0.98, 2015-04-18</a:t>
+            </a:r>
           </a:p>
         </p:txBody>
       </p:sp>
@@ -6563,8 +6552,8 @@
             </a:prstGeom>
             <a:solidFill>
               <a:schemeClr val="accent2">
-                <a:lumMod val="60000"/>
-                <a:lumOff val="40000"/>
+                <a:lumMod val="40000"/>
+                <a:lumOff val="60000"/>
               </a:schemeClr>
             </a:solidFill>
             <a:ln w="6350" cap="flat" cmpd="sng" algn="ctr">
@@ -8019,8 +8008,8 @@
             </a:prstGeom>
             <a:solidFill>
               <a:schemeClr val="accent2">
-                <a:lumMod val="60000"/>
-                <a:lumOff val="40000"/>
+                <a:lumMod val="40000"/>
+                <a:lumOff val="60000"/>
               </a:schemeClr>
             </a:solidFill>
             <a:ln w="6350" cap="flat" cmpd="sng" algn="ctr">
@@ -8792,9 +8781,10 @@
               <a:avLst/>
             </a:prstGeom>
             <a:solidFill>
-              <a:sysClr val="window" lastClr="FFFFFF">
-                <a:lumMod val="95000"/>
-              </a:sysClr>
+              <a:schemeClr val="accent3">
+                <a:lumMod val="60000"/>
+                <a:lumOff val="40000"/>
+              </a:schemeClr>
             </a:solidFill>
             <a:ln w="6350" cap="flat" cmpd="sng" algn="ctr">
               <a:solidFill>
@@ -8963,9 +8953,10 @@
               <a:avLst/>
             </a:prstGeom>
             <a:solidFill>
-              <a:sysClr val="window" lastClr="FFFFFF">
-                <a:lumMod val="95000"/>
-              </a:sysClr>
+              <a:schemeClr val="accent2">
+                <a:lumMod val="40000"/>
+                <a:lumOff val="60000"/>
+              </a:schemeClr>
             </a:solidFill>
             <a:ln w="6350" cap="flat" cmpd="sng" algn="ctr">
               <a:solidFill>
@@ -14622,7 +14613,7 @@
           </p:nvSpPr>
           <p:spPr>
             <a:xfrm>
-              <a:off x="4788024" y="2495452"/>
+              <a:off x="4716016" y="2495452"/>
               <a:ext cx="627842" cy="262691"/>
             </a:xfrm>
             <a:prstGeom prst="roundRect">
@@ -14793,7 +14784,7 @@
           </p:nvSpPr>
           <p:spPr>
             <a:xfrm>
-              <a:off x="5559881" y="2500191"/>
+              <a:off x="5537981" y="2500191"/>
               <a:ext cx="677544" cy="258629"/>
             </a:xfrm>
             <a:prstGeom prst="roundRect">

</xml_diff>

<commit_message>
Added a line to the initial page for w2nb
</commit_message>
<xml_diff>
--- a/resources/docs/web2native-bridge.pptx
+++ b/resources/docs/web2native-bridge.pptx
@@ -199,7 +199,7 @@
           <a:p>
             <a:fld id="{07A00844-99C3-4B4D-8665-83D6466F1606}" type="datetimeFigureOut">
               <a:rPr lang="en-US" smtClean="0"/>
-              <a:t>2015-04-21</a:t>
+              <a:t>2015-04-25</a:t>
             </a:fld>
             <a:endParaRPr lang="en-US"/>
           </a:p>
@@ -477,7 +477,7 @@
           <a:p>
             <a:fld id="{A1FD92F6-7B59-47F7-9C80-4F94E0E83D60}" type="datetimeFigureOut">
               <a:rPr lang="en-US" smtClean="0"/>
-              <a:t>2015-04-21</a:t>
+              <a:t>2015-04-25</a:t>
             </a:fld>
             <a:endParaRPr lang="en-US"/>
           </a:p>
@@ -694,7 +694,7 @@
           <a:p>
             <a:fld id="{A1FD92F6-7B59-47F7-9C80-4F94E0E83D60}" type="datetimeFigureOut">
               <a:rPr lang="en-US" smtClean="0"/>
-              <a:t>2015-04-21</a:t>
+              <a:t>2015-04-25</a:t>
             </a:fld>
             <a:endParaRPr lang="en-US"/>
           </a:p>
@@ -904,7 +904,7 @@
           <a:p>
             <a:fld id="{A1FD92F6-7B59-47F7-9C80-4F94E0E83D60}" type="datetimeFigureOut">
               <a:rPr lang="en-US" smtClean="0"/>
-              <a:t>2015-04-21</a:t>
+              <a:t>2015-04-25</a:t>
             </a:fld>
             <a:endParaRPr lang="en-US"/>
           </a:p>
@@ -1189,7 +1189,7 @@
           <a:p>
             <a:fld id="{A1FD92F6-7B59-47F7-9C80-4F94E0E83D60}" type="datetimeFigureOut">
               <a:rPr lang="en-US" smtClean="0"/>
-              <a:t>2015-04-21</a:t>
+              <a:t>2015-04-25</a:t>
             </a:fld>
             <a:endParaRPr lang="en-US"/>
           </a:p>
@@ -1472,7 +1472,7 @@
           <a:p>
             <a:fld id="{A1FD92F6-7B59-47F7-9C80-4F94E0E83D60}" type="datetimeFigureOut">
               <a:rPr lang="en-US" smtClean="0"/>
-              <a:t>2015-04-21</a:t>
+              <a:t>2015-04-25</a:t>
             </a:fld>
             <a:endParaRPr lang="en-US"/>
           </a:p>
@@ -1805,7 +1805,7 @@
           <a:p>
             <a:fld id="{A1FD92F6-7B59-47F7-9C80-4F94E0E83D60}" type="datetimeFigureOut">
               <a:rPr lang="en-US" smtClean="0"/>
-              <a:t>2015-04-21</a:t>
+              <a:t>2015-04-25</a:t>
             </a:fld>
             <a:endParaRPr lang="en-US"/>
           </a:p>
@@ -2271,7 +2271,7 @@
           <a:p>
             <a:fld id="{A1FD92F6-7B59-47F7-9C80-4F94E0E83D60}" type="datetimeFigureOut">
               <a:rPr lang="en-US" smtClean="0"/>
-              <a:t>2015-04-21</a:t>
+              <a:t>2015-04-25</a:t>
             </a:fld>
             <a:endParaRPr lang="en-US"/>
           </a:p>
@@ -2421,7 +2421,7 @@
           <a:p>
             <a:fld id="{A1FD92F6-7B59-47F7-9C80-4F94E0E83D60}" type="datetimeFigureOut">
               <a:rPr lang="en-US" smtClean="0"/>
-              <a:t>2015-04-21</a:t>
+              <a:t>2015-04-25</a:t>
             </a:fld>
             <a:endParaRPr lang="en-US"/>
           </a:p>
@@ -2540,7 +2540,7 @@
           <a:p>
             <a:fld id="{A1FD92F6-7B59-47F7-9C80-4F94E0E83D60}" type="datetimeFigureOut">
               <a:rPr lang="en-US" smtClean="0"/>
-              <a:t>2015-04-21</a:t>
+              <a:t>2015-04-25</a:t>
             </a:fld>
             <a:endParaRPr lang="en-US"/>
           </a:p>
@@ -2850,7 +2850,7 @@
           <a:p>
             <a:fld id="{A1FD92F6-7B59-47F7-9C80-4F94E0E83D60}" type="datetimeFigureOut">
               <a:rPr lang="en-US" smtClean="0"/>
-              <a:t>2015-04-21</a:t>
+              <a:t>2015-04-25</a:t>
             </a:fld>
             <a:endParaRPr lang="en-US"/>
           </a:p>
@@ -3136,7 +3136,7 @@
           <a:p>
             <a:fld id="{A1FD92F6-7B59-47F7-9C80-4F94E0E83D60}" type="datetimeFigureOut">
               <a:rPr lang="en-US" smtClean="0"/>
-              <a:t>2015-04-21</a:t>
+              <a:t>2015-04-25</a:t>
             </a:fld>
             <a:endParaRPr lang="en-US"/>
           </a:p>
@@ -3712,7 +3712,7 @@
         </p:nvSpPr>
         <p:spPr>
           <a:xfrm>
-            <a:off x="2501705" y="1548081"/>
+            <a:off x="2501705" y="1195513"/>
             <a:ext cx="4142481" cy="643253"/>
           </a:xfrm>
           <a:prstGeom prst="rect">
@@ -3776,8 +3776,8 @@
         </p:nvSpPr>
         <p:spPr>
           <a:xfrm>
-            <a:off x="955174" y="2456952"/>
-            <a:ext cx="7258000" cy="2772248"/>
+            <a:off x="955174" y="1987602"/>
+            <a:ext cx="7258000" cy="3345834"/>
           </a:xfrm>
           <a:prstGeom prst="roundRect">
             <a:avLst>
@@ -3891,7 +3891,14 @@
                 <a:latin typeface="Arial" panose="020B0604020202020204" pitchFamily="34" charset="0"/>
                 <a:cs typeface="Arial" panose="020B0604020202020204" pitchFamily="34" charset="0"/>
               </a:rPr>
-              <a:t> the functionality of the native level in the Web.</a:t>
+              <a:t> the functionality of the native level in the Web</a:t>
+            </a:r>
+            <a:r>
+              <a:rPr lang="en-US" sz="1600" dirty="0" smtClean="0">
+                <a:latin typeface="Arial" panose="020B0604020202020204" pitchFamily="34" charset="0"/>
+                <a:cs typeface="Arial" panose="020B0604020202020204" pitchFamily="34" charset="0"/>
+              </a:rPr>
+              <a:t>.</a:t>
             </a:r>
           </a:p>
           <a:p>
@@ -3901,11 +3908,18 @@
               </a:spcAft>
             </a:pPr>
             <a:r>
+              <a:rPr lang="en-US" sz="1600" dirty="0" smtClean="0">
+                <a:latin typeface="Arial" panose="020B0604020202020204" pitchFamily="34" charset="0"/>
+                <a:cs typeface="Arial" panose="020B0604020202020204" pitchFamily="34" charset="0"/>
+              </a:rPr>
+              <a:t>A </a:t>
+            </a:r>
+            <a:r>
               <a:rPr lang="en-US" sz="1600" dirty="0">
                 <a:latin typeface="Arial" panose="020B0604020202020204" pitchFamily="34" charset="0"/>
                 <a:cs typeface="Arial" panose="020B0604020202020204" pitchFamily="34" charset="0"/>
               </a:rPr>
-              <a:t>A core feature of </a:t>
+              <a:t>core feature of </a:t>
             </a:r>
             <a:r>
               <a:rPr lang="en-US" sz="1600" dirty="0" smtClean="0">
@@ -3961,8 +3975,68 @@
                 <a:latin typeface="Arial" panose="020B0604020202020204" pitchFamily="34" charset="0"/>
                 <a:cs typeface="Arial" panose="020B0604020202020204" pitchFamily="34" charset="0"/>
               </a:rPr>
-              <a:t>innovation.</a:t>
-            </a:r>
+              <a:t>innovation</a:t>
+            </a:r>
+            <a:r>
+              <a:rPr lang="en-US" sz="1600" i="1" dirty="0" smtClean="0">
+                <a:latin typeface="Arial" panose="020B0604020202020204" pitchFamily="34" charset="0"/>
+                <a:cs typeface="Arial" panose="020B0604020202020204" pitchFamily="34" charset="0"/>
+              </a:rPr>
+              <a:t>.</a:t>
+            </a:r>
+          </a:p>
+          <a:p>
+            <a:pPr>
+              <a:spcAft>
+                <a:spcPts val="800"/>
+              </a:spcAft>
+            </a:pPr>
+            <a:r>
+              <a:rPr lang="en-US" sz="1600" dirty="0" smtClean="0">
+                <a:latin typeface="Arial" panose="020B0604020202020204" pitchFamily="34" charset="0"/>
+                <a:cs typeface="Arial" panose="020B0604020202020204" pitchFamily="34" charset="0"/>
+              </a:rPr>
+              <a:t>In </a:t>
+            </a:r>
+            <a:r>
+              <a:rPr lang="en-US" sz="1600" dirty="0">
+                <a:latin typeface="Arial" panose="020B0604020202020204" pitchFamily="34" charset="0"/>
+                <a:cs typeface="Arial" panose="020B0604020202020204" pitchFamily="34" charset="0"/>
+              </a:rPr>
+              <a:t>contrast to jumping between the Web and single-purpose </a:t>
+            </a:r>
+            <a:r>
+              <a:rPr lang="en-US" sz="1600" dirty="0" smtClean="0">
+                <a:latin typeface="Arial" panose="020B0604020202020204" pitchFamily="34" charset="0"/>
+                <a:cs typeface="Arial" panose="020B0604020202020204" pitchFamily="34" charset="0"/>
+              </a:rPr>
+              <a:t>“Apps”, a more </a:t>
+            </a:r>
+            <a:r>
+              <a:rPr lang="en-US" sz="1600" i="1" dirty="0">
+                <a:latin typeface="Arial" panose="020B0604020202020204" pitchFamily="34" charset="0"/>
+                <a:cs typeface="Arial" panose="020B0604020202020204" pitchFamily="34" charset="0"/>
+              </a:rPr>
+              <a:t>seamless Web </a:t>
+            </a:r>
+            <a:r>
+              <a:rPr lang="en-US" sz="1600" i="1" dirty="0" smtClean="0">
+                <a:latin typeface="Arial" panose="020B0604020202020204" pitchFamily="34" charset="0"/>
+                <a:cs typeface="Arial" panose="020B0604020202020204" pitchFamily="34" charset="0"/>
+              </a:rPr>
+              <a:t>experience</a:t>
+            </a:r>
+            <a:r>
+              <a:rPr lang="en-US" sz="1600" dirty="0" smtClean="0">
+                <a:latin typeface="Arial" panose="020B0604020202020204" pitchFamily="34" charset="0"/>
+                <a:cs typeface="Arial" panose="020B0604020202020204" pitchFamily="34" charset="0"/>
+              </a:rPr>
+              <a:t> is facilitated.</a:t>
+            </a:r>
+            <a:endParaRPr lang="en-US" sz="1600" dirty="0">
+              <a:latin typeface="Arial" panose="020B0604020202020204" pitchFamily="34" charset="0"/>
+              <a:cs typeface="Arial" panose="020B0604020202020204" pitchFamily="34" charset="0"/>
+            </a:endParaRPr>
           </a:p>
           <a:p>
             <a:pPr>
@@ -4206,7 +4280,7 @@
         </p:nvSpPr>
         <p:spPr>
           <a:xfrm>
-            <a:off x="2860400" y="908720"/>
+            <a:off x="2860400" y="620688"/>
             <a:ext cx="3447547" cy="643253"/>
           </a:xfrm>
           <a:prstGeom prst="rect">

</xml_diff>

<commit_message>
Minor tweaks on security considerations
</commit_message>
<xml_diff>
--- a/resources/docs/web2native-bridge.pptx
+++ b/resources/docs/web2native-bridge.pptx
@@ -199,7 +199,7 @@
           <a:p>
             <a:fld id="{07A00844-99C3-4B4D-8665-83D6466F1606}" type="datetimeFigureOut">
               <a:rPr lang="en-US" smtClean="0"/>
-              <a:t>2015-04-25</a:t>
+              <a:t>2015-04-28</a:t>
             </a:fld>
             <a:endParaRPr lang="en-US"/>
           </a:p>
@@ -477,7 +477,7 @@
           <a:p>
             <a:fld id="{A1FD92F6-7B59-47F7-9C80-4F94E0E83D60}" type="datetimeFigureOut">
               <a:rPr lang="en-US" smtClean="0"/>
-              <a:t>2015-04-25</a:t>
+              <a:t>2015-04-28</a:t>
             </a:fld>
             <a:endParaRPr lang="en-US"/>
           </a:p>
@@ -694,7 +694,7 @@
           <a:p>
             <a:fld id="{A1FD92F6-7B59-47F7-9C80-4F94E0E83D60}" type="datetimeFigureOut">
               <a:rPr lang="en-US" smtClean="0"/>
-              <a:t>2015-04-25</a:t>
+              <a:t>2015-04-28</a:t>
             </a:fld>
             <a:endParaRPr lang="en-US"/>
           </a:p>
@@ -904,7 +904,7 @@
           <a:p>
             <a:fld id="{A1FD92F6-7B59-47F7-9C80-4F94E0E83D60}" type="datetimeFigureOut">
               <a:rPr lang="en-US" smtClean="0"/>
-              <a:t>2015-04-25</a:t>
+              <a:t>2015-04-28</a:t>
             </a:fld>
             <a:endParaRPr lang="en-US"/>
           </a:p>
@@ -1189,7 +1189,7 @@
           <a:p>
             <a:fld id="{A1FD92F6-7B59-47F7-9C80-4F94E0E83D60}" type="datetimeFigureOut">
               <a:rPr lang="en-US" smtClean="0"/>
-              <a:t>2015-04-25</a:t>
+              <a:t>2015-04-28</a:t>
             </a:fld>
             <a:endParaRPr lang="en-US"/>
           </a:p>
@@ -1472,7 +1472,7 @@
           <a:p>
             <a:fld id="{A1FD92F6-7B59-47F7-9C80-4F94E0E83D60}" type="datetimeFigureOut">
               <a:rPr lang="en-US" smtClean="0"/>
-              <a:t>2015-04-25</a:t>
+              <a:t>2015-04-28</a:t>
             </a:fld>
             <a:endParaRPr lang="en-US"/>
           </a:p>
@@ -1805,7 +1805,7 @@
           <a:p>
             <a:fld id="{A1FD92F6-7B59-47F7-9C80-4F94E0E83D60}" type="datetimeFigureOut">
               <a:rPr lang="en-US" smtClean="0"/>
-              <a:t>2015-04-25</a:t>
+              <a:t>2015-04-28</a:t>
             </a:fld>
             <a:endParaRPr lang="en-US"/>
           </a:p>
@@ -2271,7 +2271,7 @@
           <a:p>
             <a:fld id="{A1FD92F6-7B59-47F7-9C80-4F94E0E83D60}" type="datetimeFigureOut">
               <a:rPr lang="en-US" smtClean="0"/>
-              <a:t>2015-04-25</a:t>
+              <a:t>2015-04-28</a:t>
             </a:fld>
             <a:endParaRPr lang="en-US"/>
           </a:p>
@@ -2421,7 +2421,7 @@
           <a:p>
             <a:fld id="{A1FD92F6-7B59-47F7-9C80-4F94E0E83D60}" type="datetimeFigureOut">
               <a:rPr lang="en-US" smtClean="0"/>
-              <a:t>2015-04-25</a:t>
+              <a:t>2015-04-28</a:t>
             </a:fld>
             <a:endParaRPr lang="en-US"/>
           </a:p>
@@ -2540,7 +2540,7 @@
           <a:p>
             <a:fld id="{A1FD92F6-7B59-47F7-9C80-4F94E0E83D60}" type="datetimeFigureOut">
               <a:rPr lang="en-US" smtClean="0"/>
-              <a:t>2015-04-25</a:t>
+              <a:t>2015-04-28</a:t>
             </a:fld>
             <a:endParaRPr lang="en-US"/>
           </a:p>
@@ -2850,7 +2850,7 @@
           <a:p>
             <a:fld id="{A1FD92F6-7B59-47F7-9C80-4F94E0E83D60}" type="datetimeFigureOut">
               <a:rPr lang="en-US" smtClean="0"/>
-              <a:t>2015-04-25</a:t>
+              <a:t>2015-04-28</a:t>
             </a:fld>
             <a:endParaRPr lang="en-US"/>
           </a:p>
@@ -3136,7 +3136,7 @@
           <a:p>
             <a:fld id="{A1FD92F6-7B59-47F7-9C80-4F94E0E83D60}" type="datetimeFigureOut">
               <a:rPr lang="en-US" smtClean="0"/>
-              <a:t>2015-04-25</a:t>
+              <a:t>2015-04-28</a:t>
             </a:fld>
             <a:endParaRPr lang="en-US"/>
           </a:p>
@@ -3891,14 +3891,7 @@
                 <a:latin typeface="Arial" panose="020B0604020202020204" pitchFamily="34" charset="0"/>
                 <a:cs typeface="Arial" panose="020B0604020202020204" pitchFamily="34" charset="0"/>
               </a:rPr>
-              <a:t> the functionality of the native level in the Web</a:t>
-            </a:r>
-            <a:r>
-              <a:rPr lang="en-US" sz="1600" dirty="0" smtClean="0">
-                <a:latin typeface="Arial" panose="020B0604020202020204" pitchFamily="34" charset="0"/>
-                <a:cs typeface="Arial" panose="020B0604020202020204" pitchFamily="34" charset="0"/>
-              </a:rPr>
-              <a:t>.</a:t>
+              <a:t> the functionality of the native level in the Web.</a:t>
             </a:r>
           </a:p>
           <a:p>
@@ -3975,14 +3968,7 @@
                 <a:latin typeface="Arial" panose="020B0604020202020204" pitchFamily="34" charset="0"/>
                 <a:cs typeface="Arial" panose="020B0604020202020204" pitchFamily="34" charset="0"/>
               </a:rPr>
-              <a:t>innovation</a:t>
-            </a:r>
-            <a:r>
-              <a:rPr lang="en-US" sz="1600" i="1" dirty="0" smtClean="0">
-                <a:latin typeface="Arial" panose="020B0604020202020204" pitchFamily="34" charset="0"/>
-                <a:cs typeface="Arial" panose="020B0604020202020204" pitchFamily="34" charset="0"/>
-              </a:rPr>
-              <a:t>.</a:t>
+              <a:t>innovation.</a:t>
             </a:r>
           </a:p>
           <a:p>
@@ -12999,8 +12985,8 @@
         </p:nvSpPr>
         <p:spPr>
           <a:xfrm>
-            <a:off x="395536" y="734208"/>
-            <a:ext cx="8280920" cy="6093976"/>
+            <a:off x="395536" y="721296"/>
+            <a:ext cx="8280920" cy="5770811"/>
           </a:xfrm>
           <a:prstGeom prst="rect">
             <a:avLst/>
@@ -13008,7 +12994,7 @@
           <a:noFill/>
         </p:spPr>
         <p:txBody>
-          <a:bodyPr wrap="square" rtlCol="0">
+          <a:bodyPr wrap="square" tIns="0" bIns="0" rtlCol="0" anchor="ctr" anchorCtr="0">
             <a:spAutoFit/>
           </a:bodyPr>
           <a:lstStyle/>
@@ -13019,25 +13005,18 @@
               </a:spcAft>
             </a:pPr>
             <a:r>
-              <a:rPr lang="en-US" sz="1000" dirty="0" smtClean="0">
-                <a:latin typeface="Arial" panose="020B0604020202020204" pitchFamily="34" charset="0"/>
-                <a:cs typeface="Arial" panose="020B0604020202020204" pitchFamily="34" charset="0"/>
-              </a:rPr>
-              <a:t>Note: This section does not deal </a:t>
-            </a:r>
-            <a:r>
-              <a:rPr lang="en-US" sz="1000" dirty="0">
-                <a:latin typeface="Arial" panose="020B0604020202020204" pitchFamily="34" charset="0"/>
-                <a:cs typeface="Arial" panose="020B0604020202020204" pitchFamily="34" charset="0"/>
-              </a:rPr>
-              <a:t>with </a:t>
-            </a:r>
-            <a:r>
-              <a:rPr lang="en-US" sz="1000" dirty="0" smtClean="0">
-                <a:latin typeface="Arial" panose="020B0604020202020204" pitchFamily="34" charset="0"/>
-                <a:cs typeface="Arial" panose="020B0604020202020204" pitchFamily="34" charset="0"/>
-              </a:rPr>
-              <a:t>robustness of implementations or how the system operates if the platform is compromised.</a:t>
+              <a:rPr lang="en-US" sz="1000" b="1" dirty="0" smtClean="0">
+                <a:latin typeface="Arial" panose="020B0604020202020204" pitchFamily="34" charset="0"/>
+                <a:cs typeface="Arial" panose="020B0604020202020204" pitchFamily="34" charset="0"/>
+              </a:rPr>
+              <a:t>Browser </a:t>
+            </a:r>
+            <a:r>
+              <a:rPr lang="en-US" sz="1000" b="1" dirty="0" smtClean="0">
+                <a:latin typeface="Arial" panose="020B0604020202020204" pitchFamily="34" charset="0"/>
+                <a:cs typeface="Arial" panose="020B0604020202020204" pitchFamily="34" charset="0"/>
+              </a:rPr>
+              <a:t>Security</a:t>
             </a:r>
           </a:p>
           <a:p>
@@ -13047,12 +13026,79 @@
               </a:spcAft>
             </a:pPr>
             <a:r>
-              <a:rPr lang="en-US" sz="1000" b="1" dirty="0" smtClean="0">
-                <a:latin typeface="Arial" panose="020B0604020202020204" pitchFamily="34" charset="0"/>
-                <a:cs typeface="Arial" panose="020B0604020202020204" pitchFamily="34" charset="0"/>
-              </a:rPr>
-              <a:t>Browser Security</a:t>
-            </a:r>
+              <a:rPr lang="en-US" sz="1000" dirty="0">
+                <a:latin typeface="Arial" panose="020B0604020202020204" pitchFamily="34" charset="0"/>
+                <a:cs typeface="Arial" panose="020B0604020202020204" pitchFamily="34" charset="0"/>
+              </a:rPr>
+              <a:t>The Web2Native Bridge introduces </a:t>
+            </a:r>
+            <a:r>
+              <a:rPr lang="en-US" sz="1000" dirty="0" smtClean="0">
+                <a:latin typeface="Arial" panose="020B0604020202020204" pitchFamily="34" charset="0"/>
+                <a:cs typeface="Arial" panose="020B0604020202020204" pitchFamily="34" charset="0"/>
+              </a:rPr>
+              <a:t>a mechanism </a:t>
+            </a:r>
+            <a:r>
+              <a:rPr lang="en-US" sz="1000" dirty="0">
+                <a:latin typeface="Arial" panose="020B0604020202020204" pitchFamily="34" charset="0"/>
+                <a:cs typeface="Arial" panose="020B0604020202020204" pitchFamily="34" charset="0"/>
+              </a:rPr>
+              <a:t>which </a:t>
+            </a:r>
+            <a:r>
+              <a:rPr lang="en-US" sz="1000" dirty="0" smtClean="0">
+                <a:latin typeface="Arial" panose="020B0604020202020204" pitchFamily="34" charset="0"/>
+                <a:cs typeface="Arial" panose="020B0604020202020204" pitchFamily="34" charset="0"/>
+              </a:rPr>
+              <a:t>enables standard web-applications invoking </a:t>
+            </a:r>
+            <a:r>
+              <a:rPr lang="en-US" sz="1000" i="1" dirty="0" smtClean="0">
+                <a:latin typeface="Arial" panose="020B0604020202020204" pitchFamily="34" charset="0"/>
+                <a:cs typeface="Arial" panose="020B0604020202020204" pitchFamily="34" charset="0"/>
+              </a:rPr>
+              <a:t>external</a:t>
+            </a:r>
+            <a:r>
+              <a:rPr lang="en-US" sz="1000" dirty="0" smtClean="0">
+                <a:latin typeface="Arial" panose="020B0604020202020204" pitchFamily="34" charset="0"/>
+                <a:cs typeface="Arial" panose="020B0604020202020204" pitchFamily="34" charset="0"/>
+              </a:rPr>
+              <a:t> (local) applications through a new interface (TBD).  This does not in itself present a risk </a:t>
+            </a:r>
+            <a:r>
+              <a:rPr lang="en-US" sz="1000" dirty="0" smtClean="0">
+                <a:latin typeface="Arial" panose="020B0604020202020204" pitchFamily="34" charset="0"/>
+                <a:cs typeface="Arial" panose="020B0604020202020204" pitchFamily="34" charset="0"/>
+              </a:rPr>
+              <a:t>specifically to </a:t>
+            </a:r>
+            <a:r>
+              <a:rPr lang="en-US" sz="1000" dirty="0" smtClean="0">
+                <a:latin typeface="Arial" panose="020B0604020202020204" pitchFamily="34" charset="0"/>
+                <a:cs typeface="Arial" panose="020B0604020202020204" pitchFamily="34" charset="0"/>
+              </a:rPr>
+              <a:t>the </a:t>
+            </a:r>
+            <a:r>
+              <a:rPr lang="en-US" sz="1000" i="1" dirty="0" smtClean="0">
+                <a:latin typeface="Arial" panose="020B0604020202020204" pitchFamily="34" charset="0"/>
+                <a:cs typeface="Arial" panose="020B0604020202020204" pitchFamily="34" charset="0"/>
+              </a:rPr>
+              <a:t>browser environment</a:t>
+            </a:r>
+            <a:r>
+              <a:rPr lang="en-US" sz="1000" dirty="0" smtClean="0">
+                <a:latin typeface="Arial" panose="020B0604020202020204" pitchFamily="34" charset="0"/>
+                <a:cs typeface="Arial" panose="020B0604020202020204" pitchFamily="34" charset="0"/>
+              </a:rPr>
+              <a:t>.</a:t>
+            </a:r>
+            <a:endParaRPr lang="en-US" sz="1000" dirty="0">
+              <a:latin typeface="Arial" panose="020B0604020202020204" pitchFamily="34" charset="0"/>
+              <a:cs typeface="Arial" panose="020B0604020202020204" pitchFamily="34" charset="0"/>
+            </a:endParaRPr>
           </a:p>
           <a:p>
             <a:pPr>
@@ -13061,65 +13107,114 @@
               </a:spcAft>
             </a:pPr>
             <a:r>
-              <a:rPr lang="en-US" sz="1000" dirty="0">
-                <a:latin typeface="Arial" panose="020B0604020202020204" pitchFamily="34" charset="0"/>
-                <a:cs typeface="Arial" panose="020B0604020202020204" pitchFamily="34" charset="0"/>
-              </a:rPr>
-              <a:t>The Web2Native Bridge introduces </a:t>
-            </a:r>
-            <a:r>
               <a:rPr lang="en-US" sz="1000" dirty="0" smtClean="0">
                 <a:latin typeface="Arial" panose="020B0604020202020204" pitchFamily="34" charset="0"/>
                 <a:cs typeface="Arial" panose="020B0604020202020204" pitchFamily="34" charset="0"/>
               </a:rPr>
-              <a:t>a mechanism </a:t>
-            </a:r>
-            <a:r>
-              <a:rPr lang="en-US" sz="1000" dirty="0">
-                <a:latin typeface="Arial" panose="020B0604020202020204" pitchFamily="34" charset="0"/>
-                <a:cs typeface="Arial" panose="020B0604020202020204" pitchFamily="34" charset="0"/>
-              </a:rPr>
-              <a:t>which </a:t>
+              <a:t>After successful invocation the Web2Native Bridge creates a </a:t>
+            </a:r>
+            <a:r>
+              <a:rPr lang="en-US" sz="1000" i="1" dirty="0">
+                <a:latin typeface="Arial" panose="020B0604020202020204" pitchFamily="34" charset="0"/>
+                <a:cs typeface="Arial" panose="020B0604020202020204" pitchFamily="34" charset="0"/>
+              </a:rPr>
+              <a:t>bi-directional </a:t>
+            </a:r>
+            <a:r>
+              <a:rPr lang="en-US" sz="1000" i="1" dirty="0" smtClean="0">
+                <a:latin typeface="Arial" panose="020B0604020202020204" pitchFamily="34" charset="0"/>
+                <a:cs typeface="Arial" panose="020B0604020202020204" pitchFamily="34" charset="0"/>
+              </a:rPr>
+              <a:t>trusted message channel</a:t>
             </a:r>
             <a:r>
               <a:rPr lang="en-US" sz="1000" dirty="0" smtClean="0">
                 <a:latin typeface="Arial" panose="020B0604020202020204" pitchFamily="34" charset="0"/>
                 <a:cs typeface="Arial" panose="020B0604020202020204" pitchFamily="34" charset="0"/>
               </a:rPr>
-              <a:t>enables standard web-applications invoking </a:t>
-            </a:r>
-            <a:r>
-              <a:rPr lang="en-US" sz="1000" i="1" dirty="0" smtClean="0">
-                <a:latin typeface="Arial" panose="020B0604020202020204" pitchFamily="34" charset="0"/>
-                <a:cs typeface="Arial" panose="020B0604020202020204" pitchFamily="34" charset="0"/>
-              </a:rPr>
-              <a:t>external</a:t>
+              <a:t> to the invoked application which from the browser’s side has similar properties to the already established </a:t>
+            </a:r>
+            <a:r>
+              <a:rPr lang="en-US" sz="1000" b="1" dirty="0" err="1" smtClean="0">
+                <a:latin typeface="Courier New" panose="02070309020205020404" pitchFamily="49" charset="0"/>
+                <a:cs typeface="Courier New" panose="02070309020205020404" pitchFamily="49" charset="0"/>
+              </a:rPr>
+              <a:t>postMessage</a:t>
+            </a:r>
+            <a:r>
+              <a:rPr lang="en-US" sz="1000" b="1" dirty="0" smtClean="0">
+                <a:latin typeface="Courier New" panose="02070309020205020404" pitchFamily="49" charset="0"/>
+                <a:cs typeface="Courier New" panose="02070309020205020404" pitchFamily="49" charset="0"/>
+              </a:rPr>
+              <a:t>()</a:t>
             </a:r>
             <a:r>
               <a:rPr lang="en-US" sz="1000" dirty="0" smtClean="0">
                 <a:latin typeface="Arial" panose="020B0604020202020204" pitchFamily="34" charset="0"/>
                 <a:cs typeface="Arial" panose="020B0604020202020204" pitchFamily="34" charset="0"/>
               </a:rPr>
-              <a:t> (local) applications through a new interface (TBD).  This does not in itself present a risk to the </a:t>
-            </a:r>
-            <a:r>
-              <a:rPr lang="en-US" sz="1000" i="1" dirty="0" smtClean="0">
-                <a:latin typeface="Arial" panose="020B0604020202020204" pitchFamily="34" charset="0"/>
-                <a:cs typeface="Arial" panose="020B0604020202020204" pitchFamily="34" charset="0"/>
-              </a:rPr>
-              <a:t>browser environment</a:t>
+              <a:t> and </a:t>
+            </a:r>
+            <a:r>
+              <a:rPr lang="en-US" sz="1000" b="1" dirty="0" err="1" smtClean="0">
+                <a:latin typeface="Courier New" panose="02070309020205020404" pitchFamily="49" charset="0"/>
+                <a:cs typeface="Courier New" panose="02070309020205020404" pitchFamily="49" charset="0"/>
+              </a:rPr>
+              <a:t>addEventListener</a:t>
+            </a:r>
+            <a:r>
+              <a:rPr lang="en-US" sz="1000" b="1" dirty="0" smtClean="0">
+                <a:latin typeface="Courier New" panose="02070309020205020404" pitchFamily="49" charset="0"/>
+                <a:cs typeface="Courier New" panose="02070309020205020404" pitchFamily="49" charset="0"/>
+              </a:rPr>
+              <a:t>()</a:t>
             </a:r>
             <a:r>
               <a:rPr lang="en-US" sz="1000" dirty="0" smtClean="0">
                 <a:latin typeface="Arial" panose="020B0604020202020204" pitchFamily="34" charset="0"/>
                 <a:cs typeface="Arial" panose="020B0604020202020204" pitchFamily="34" charset="0"/>
               </a:rPr>
-              <a:t>.</a:t>
-            </a:r>
-            <a:endParaRPr lang="en-US" sz="1000" dirty="0">
+              <a:t> </a:t>
+            </a:r>
+            <a:r>
+              <a:rPr lang="en-US" sz="1000" dirty="0" smtClean="0">
+                <a:latin typeface="Arial" panose="020B0604020202020204" pitchFamily="34" charset="0"/>
+                <a:cs typeface="Arial" panose="020B0604020202020204" pitchFamily="34" charset="0"/>
+              </a:rPr>
+              <a:t>methods.</a:t>
+            </a:r>
+            <a:endParaRPr lang="en-US" sz="1000" dirty="0" smtClean="0">
               <a:latin typeface="Arial" panose="020B0604020202020204" pitchFamily="34" charset="0"/>
               <a:cs typeface="Arial" panose="020B0604020202020204" pitchFamily="34" charset="0"/>
             </a:endParaRPr>
+          </a:p>
+          <a:p>
+            <a:pPr>
+              <a:spcAft>
+                <a:spcPts val="1200"/>
+              </a:spcAft>
+            </a:pPr>
+            <a:r>
+              <a:rPr lang="en-US" sz="1000" dirty="0" smtClean="0">
+                <a:latin typeface="Arial" panose="020B0604020202020204" pitchFamily="34" charset="0"/>
+                <a:cs typeface="Arial" panose="020B0604020202020204" pitchFamily="34" charset="0"/>
+              </a:rPr>
+              <a:t>That is, the </a:t>
+            </a:r>
+            <a:r>
+              <a:rPr lang="en-US" sz="1000" dirty="0">
+                <a:latin typeface="Arial" panose="020B0604020202020204" pitchFamily="34" charset="0"/>
+                <a:cs typeface="Arial" panose="020B0604020202020204" pitchFamily="34" charset="0"/>
+              </a:rPr>
+              <a:t>Web2Native Bridge </a:t>
+            </a:r>
+            <a:r>
+              <a:rPr lang="en-US" sz="1000" dirty="0" smtClean="0">
+                <a:latin typeface="Arial" panose="020B0604020202020204" pitchFamily="34" charset="0"/>
+                <a:cs typeface="Arial" panose="020B0604020202020204" pitchFamily="34" charset="0"/>
+              </a:rPr>
+              <a:t>does not rely on installing custom code directly in the browser like the deprecated NPAPI did.</a:t>
+            </a:r>
           </a:p>
           <a:p>
             <a:pPr>
@@ -13128,88 +13223,199 @@
               </a:spcAft>
             </a:pPr>
             <a:r>
+              <a:rPr lang="en-US" sz="1000" b="1" dirty="0" smtClean="0">
+                <a:latin typeface="Arial" panose="020B0604020202020204" pitchFamily="34" charset="0"/>
+                <a:cs typeface="Arial" panose="020B0604020202020204" pitchFamily="34" charset="0"/>
+              </a:rPr>
+              <a:t>Platform Security</a:t>
+            </a:r>
+          </a:p>
+          <a:p>
+            <a:pPr>
+              <a:spcAft>
+                <a:spcPts val="600"/>
+              </a:spcAft>
+            </a:pPr>
+            <a:r>
               <a:rPr lang="en-US" sz="1000" dirty="0" smtClean="0">
                 <a:latin typeface="Arial" panose="020B0604020202020204" pitchFamily="34" charset="0"/>
                 <a:cs typeface="Arial" panose="020B0604020202020204" pitchFamily="34" charset="0"/>
               </a:rPr>
-              <a:t>After successful invocation the Web2Native Bridge creates a </a:t>
-            </a:r>
-            <a:r>
-              <a:rPr lang="en-US" sz="1000" i="1" dirty="0">
-                <a:latin typeface="Arial" panose="020B0604020202020204" pitchFamily="34" charset="0"/>
-                <a:cs typeface="Arial" panose="020B0604020202020204" pitchFamily="34" charset="0"/>
-              </a:rPr>
-              <a:t>bi-directional </a:t>
+              <a:t>An external application of the type used by the Web2Native Bridge would most likely have the same possibilities as any other local application running in the user’s context.</a:t>
+            </a:r>
+          </a:p>
+          <a:p>
+            <a:pPr>
+              <a:spcAft>
+                <a:spcPts val="600"/>
+              </a:spcAft>
+            </a:pPr>
+            <a:r>
+              <a:rPr lang="en-US" sz="1000" dirty="0" smtClean="0">
+                <a:latin typeface="Arial" panose="020B0604020202020204" pitchFamily="34" charset="0"/>
+                <a:cs typeface="Arial" panose="020B0604020202020204" pitchFamily="34" charset="0"/>
+              </a:rPr>
+              <a:t>In contrast to traditional local applications, </a:t>
             </a:r>
             <a:r>
               <a:rPr lang="en-US" sz="1000" i="1" dirty="0" smtClean="0">
                 <a:latin typeface="Arial" panose="020B0604020202020204" pitchFamily="34" charset="0"/>
                 <a:cs typeface="Arial" panose="020B0604020202020204" pitchFamily="34" charset="0"/>
               </a:rPr>
-              <a:t>trusted </a:t>
-            </a:r>
-            <a:r>
-              <a:rPr lang="en-US" sz="1000" i="1" smtClean="0">
-                <a:latin typeface="Arial" panose="020B0604020202020204" pitchFamily="34" charset="0"/>
-                <a:cs typeface="Arial" panose="020B0604020202020204" pitchFamily="34" charset="0"/>
-              </a:rPr>
-              <a:t>message channel</a:t>
-            </a:r>
-            <a:r>
-              <a:rPr lang="en-US" sz="1000" smtClean="0">
-                <a:latin typeface="Arial" panose="020B0604020202020204" pitchFamily="34" charset="0"/>
-                <a:cs typeface="Arial" panose="020B0604020202020204" pitchFamily="34" charset="0"/>
-              </a:rPr>
-              <a:t> to </a:t>
+              <a:t>Web2Native Bridge applications can typically be invoked by any web-site</a:t>
             </a:r>
             <a:r>
               <a:rPr lang="en-US" sz="1000" dirty="0" smtClean="0">
                 <a:latin typeface="Arial" panose="020B0604020202020204" pitchFamily="34" charset="0"/>
                 <a:cs typeface="Arial" panose="020B0604020202020204" pitchFamily="34" charset="0"/>
               </a:rPr>
-              <a:t>the invoked application which from the browser’s side has similar properties to the already established </a:t>
-            </a:r>
-            <a:r>
-              <a:rPr lang="en-US" sz="1000" b="1" dirty="0" err="1" smtClean="0">
-                <a:latin typeface="Courier New" panose="02070309020205020404" pitchFamily="49" charset="0"/>
-                <a:cs typeface="Courier New" panose="02070309020205020404" pitchFamily="49" charset="0"/>
-              </a:rPr>
-              <a:t>postMessage</a:t>
-            </a:r>
-            <a:r>
-              <a:rPr lang="en-US" sz="1000" b="1" dirty="0" smtClean="0">
-                <a:latin typeface="Courier New" panose="02070309020205020404" pitchFamily="49" charset="0"/>
-                <a:cs typeface="Courier New" panose="02070309020205020404" pitchFamily="49" charset="0"/>
-              </a:rPr>
-              <a:t>()</a:t>
+              <a:t>.  For large-scale usage, such applications MUST therefore be vetted in a specific way to avoid potential security or privacy violations.  That is, it MUST NOT be possible invoking trust-wise unknown Web2Native Bridge applications except for development purposes.  Also see </a:t>
+            </a:r>
+            <a:r>
+              <a:rPr lang="en-US" sz="1000" dirty="0">
+                <a:latin typeface="Arial" panose="020B0604020202020204" pitchFamily="34" charset="0"/>
+                <a:cs typeface="Arial" panose="020B0604020202020204" pitchFamily="34" charset="0"/>
+                <a:hlinkClick r:id="rId2" action="ppaction://hlinksldjump"/>
+              </a:rPr>
+              <a:t>HTTPS </a:t>
             </a:r>
             <a:r>
               <a:rPr lang="en-US" sz="1000" dirty="0" smtClean="0">
                 <a:latin typeface="Arial" panose="020B0604020202020204" pitchFamily="34" charset="0"/>
                 <a:cs typeface="Arial" panose="020B0604020202020204" pitchFamily="34" charset="0"/>
-              </a:rPr>
-              <a:t> and </a:t>
-            </a:r>
-            <a:r>
-              <a:rPr lang="en-US" sz="1000" b="1" dirty="0" err="1" smtClean="0">
-                <a:latin typeface="Courier New" panose="02070309020205020404" pitchFamily="49" charset="0"/>
-                <a:cs typeface="Courier New" panose="02070309020205020404" pitchFamily="49" charset="0"/>
-              </a:rPr>
-              <a:t>addEventListener</a:t>
-            </a:r>
-            <a:r>
-              <a:rPr lang="en-US" sz="1000" b="1" dirty="0" smtClean="0">
-                <a:latin typeface="Courier New" panose="02070309020205020404" pitchFamily="49" charset="0"/>
-                <a:cs typeface="Courier New" panose="02070309020205020404" pitchFamily="49" charset="0"/>
-              </a:rPr>
-              <a:t>()</a:t>
+                <a:hlinkClick r:id="rId2" action="ppaction://hlinksldjump"/>
+              </a:rPr>
+              <a:t>CCA</a:t>
             </a:r>
             <a:r>
               <a:rPr lang="en-US" sz="1000" dirty="0" smtClean="0">
                 <a:latin typeface="Arial" panose="020B0604020202020204" pitchFamily="34" charset="0"/>
                 <a:cs typeface="Arial" panose="020B0604020202020204" pitchFamily="34" charset="0"/>
               </a:rPr>
-              <a:t> functions.</a:t>
+              <a:t>.</a:t>
+            </a:r>
+          </a:p>
+          <a:p>
+            <a:pPr>
+              <a:spcAft>
+                <a:spcPts val="600"/>
+              </a:spcAft>
+            </a:pPr>
+            <a:r>
+              <a:rPr lang="en-US" sz="1000" dirty="0" smtClean="0">
+                <a:latin typeface="Arial" panose="020B0604020202020204" pitchFamily="34" charset="0"/>
+                <a:cs typeface="Arial" panose="020B0604020202020204" pitchFamily="34" charset="0"/>
+              </a:rPr>
+              <a:t>Web2Native </a:t>
+            </a:r>
+            <a:r>
+              <a:rPr lang="en-US" sz="1000" dirty="0">
+                <a:latin typeface="Arial" panose="020B0604020202020204" pitchFamily="34" charset="0"/>
+                <a:cs typeface="Arial" panose="020B0604020202020204" pitchFamily="34" charset="0"/>
+              </a:rPr>
+              <a:t>Bridge </a:t>
+            </a:r>
+            <a:r>
+              <a:rPr lang="en-US" sz="1000" dirty="0" smtClean="0">
+                <a:latin typeface="Arial" panose="020B0604020202020204" pitchFamily="34" charset="0"/>
+                <a:cs typeface="Arial" panose="020B0604020202020204" pitchFamily="34" charset="0"/>
+              </a:rPr>
+              <a:t>invocation requests MUST be derivable to secure origins (authenticated by HTTPS).</a:t>
+            </a:r>
+          </a:p>
+          <a:p>
+            <a:pPr>
+              <a:spcAft>
+                <a:spcPts val="600"/>
+              </a:spcAft>
+            </a:pPr>
+            <a:r>
+              <a:rPr lang="en-US" sz="1000" dirty="0" smtClean="0">
+                <a:latin typeface="Arial" panose="020B0604020202020204" pitchFamily="34" charset="0"/>
+                <a:cs typeface="Arial" panose="020B0604020202020204" pitchFamily="34" charset="0"/>
+              </a:rPr>
+              <a:t>Web2Native Bridge applications MUST in a clear way inform users what is requested as well as including the ability to cancel the request and possibly also offering an option to block</a:t>
+            </a:r>
+            <a:r>
+              <a:rPr lang="en-US" sz="1000" dirty="0">
+                <a:latin typeface="Arial" panose="020B0604020202020204" pitchFamily="34" charset="0"/>
+                <a:cs typeface="Arial" panose="020B0604020202020204" pitchFamily="34" charset="0"/>
+              </a:rPr>
+              <a:t>.</a:t>
+            </a:r>
+            <a:endParaRPr lang="en-US" sz="1000" dirty="0" smtClean="0">
+              <a:latin typeface="Arial" panose="020B0604020202020204" pitchFamily="34" charset="0"/>
+              <a:cs typeface="Arial" panose="020B0604020202020204" pitchFamily="34" charset="0"/>
+            </a:endParaRPr>
+          </a:p>
+          <a:p>
+            <a:pPr>
+              <a:spcAft>
+                <a:spcPts val="600"/>
+              </a:spcAft>
+            </a:pPr>
+            <a:r>
+              <a:rPr lang="en-US" sz="1000" dirty="0" smtClean="0">
+                <a:latin typeface="Arial" panose="020B0604020202020204" pitchFamily="34" charset="0"/>
+                <a:cs typeface="Arial" panose="020B0604020202020204" pitchFamily="34" charset="0"/>
+              </a:rPr>
+              <a:t>Each Web2Native </a:t>
+            </a:r>
+            <a:r>
+              <a:rPr lang="en-US" sz="1000" dirty="0">
+                <a:latin typeface="Arial" panose="020B0604020202020204" pitchFamily="34" charset="0"/>
+                <a:cs typeface="Arial" panose="020B0604020202020204" pitchFamily="34" charset="0"/>
+              </a:rPr>
+              <a:t>Bridge </a:t>
+            </a:r>
+            <a:r>
+              <a:rPr lang="en-US" sz="1000" dirty="0" smtClean="0">
+                <a:latin typeface="Arial" panose="020B0604020202020204" pitchFamily="34" charset="0"/>
+                <a:cs typeface="Arial" panose="020B0604020202020204" pitchFamily="34" charset="0"/>
+              </a:rPr>
+              <a:t>application exposes a specific interface based on messages passed through the </a:t>
+            </a:r>
+            <a:r>
+              <a:rPr lang="en-US" sz="1000" dirty="0">
+                <a:latin typeface="Arial" panose="020B0604020202020204" pitchFamily="34" charset="0"/>
+                <a:cs typeface="Arial" panose="020B0604020202020204" pitchFamily="34" charset="0"/>
+              </a:rPr>
+              <a:t>Web2Native Bridge </a:t>
+            </a:r>
+            <a:r>
+              <a:rPr lang="en-US" sz="1000" dirty="0" smtClean="0">
+                <a:latin typeface="Arial" panose="020B0604020202020204" pitchFamily="34" charset="0"/>
+                <a:cs typeface="Arial" panose="020B0604020202020204" pitchFamily="34" charset="0"/>
+              </a:rPr>
+              <a:t>channel. </a:t>
+            </a:r>
+            <a:r>
+              <a:rPr lang="en-US" sz="1000" dirty="0">
+                <a:latin typeface="Arial" panose="020B0604020202020204" pitchFamily="34" charset="0"/>
+                <a:cs typeface="Arial" panose="020B0604020202020204" pitchFamily="34" charset="0"/>
+              </a:rPr>
+              <a:t>Web2Native Bridge </a:t>
+            </a:r>
+            <a:r>
+              <a:rPr lang="en-US" sz="1000" dirty="0" smtClean="0">
+                <a:latin typeface="Arial" panose="020B0604020202020204" pitchFamily="34" charset="0"/>
+                <a:cs typeface="Arial" panose="020B0604020202020204" pitchFamily="34" charset="0"/>
+              </a:rPr>
+              <a:t>applications MUST verify the correctness of inbound messages and immediately abort execution if there is a mismatch.</a:t>
+            </a:r>
+          </a:p>
+          <a:p>
+            <a:pPr>
+              <a:spcAft>
+                <a:spcPts val="600"/>
+              </a:spcAft>
+            </a:pPr>
+            <a:r>
+              <a:rPr lang="en-US" sz="1000" dirty="0">
+                <a:latin typeface="Arial" panose="020B0604020202020204" pitchFamily="34" charset="0"/>
+                <a:cs typeface="Arial" panose="020B0604020202020204" pitchFamily="34" charset="0"/>
+              </a:rPr>
+              <a:t>A Web2Native Bridge application MAY restrict access to specific domains.</a:t>
             </a:r>
           </a:p>
           <a:p>
@@ -13223,21 +13429,49 @@
                 <a:latin typeface="Arial" panose="020B0604020202020204" pitchFamily="34" charset="0"/>
                 <a:cs typeface="Arial" panose="020B0604020202020204" pitchFamily="34" charset="0"/>
               </a:rPr>
-              <a:t>That is, the </a:t>
+              <a:t>A </a:t>
+            </a:r>
+            <a:r>
+              <a:rPr lang="en-US" sz="1000" dirty="0" smtClean="0">
+                <a:latin typeface="Arial" panose="020B0604020202020204" pitchFamily="34" charset="0"/>
+                <a:cs typeface="Arial" panose="020B0604020202020204" pitchFamily="34" charset="0"/>
+              </a:rPr>
+              <a:t>Web2Native </a:t>
             </a:r>
             <a:r>
               <a:rPr lang="en-US" sz="1000" dirty="0">
                 <a:latin typeface="Arial" panose="020B0604020202020204" pitchFamily="34" charset="0"/>
                 <a:cs typeface="Arial" panose="020B0604020202020204" pitchFamily="34" charset="0"/>
               </a:rPr>
-              <a:t>Web2Native Bridge </a:t>
+              <a:t>Bridge </a:t>
             </a:r>
             <a:r>
               <a:rPr lang="en-US" sz="1000" dirty="0" smtClean="0">
                 <a:latin typeface="Arial" panose="020B0604020202020204" pitchFamily="34" charset="0"/>
                 <a:cs typeface="Arial" panose="020B0604020202020204" pitchFamily="34" charset="0"/>
               </a:rPr>
-              <a:t>does not rely on installing custom code directly in the browser like the deprecated NPAPI did.</a:t>
+              <a:t>application MAY restrict access by requiring </a:t>
+            </a:r>
+            <a:r>
+              <a:rPr lang="en-US" sz="1000" dirty="0" smtClean="0">
+                <a:latin typeface="Arial" panose="020B0604020202020204" pitchFamily="34" charset="0"/>
+                <a:cs typeface="Arial" panose="020B0604020202020204" pitchFamily="34" charset="0"/>
+              </a:rPr>
+              <a:t>callers proving </a:t>
+            </a:r>
+            <a:r>
+              <a:rPr lang="en-US" sz="1000" dirty="0" smtClean="0">
+                <a:latin typeface="Arial" panose="020B0604020202020204" pitchFamily="34" charset="0"/>
+                <a:cs typeface="Arial" panose="020B0604020202020204" pitchFamily="34" charset="0"/>
+              </a:rPr>
+              <a:t>their “membership” or similar</a:t>
+            </a:r>
+            <a:r>
+              <a:rPr lang="en-US" sz="1000" dirty="0" smtClean="0">
+                <a:latin typeface="Arial" panose="020B0604020202020204" pitchFamily="34" charset="0"/>
+                <a:cs typeface="Arial" panose="020B0604020202020204" pitchFamily="34" charset="0"/>
+              </a:rPr>
+              <a:t>.</a:t>
             </a:r>
           </a:p>
           <a:p>
@@ -13251,7 +13485,14 @@
                 <a:latin typeface="Arial" panose="020B0604020202020204" pitchFamily="34" charset="0"/>
                 <a:cs typeface="Arial" panose="020B0604020202020204" pitchFamily="34" charset="0"/>
               </a:rPr>
-              <a:t>Platform Security</a:t>
+              <a:t>Privacy </a:t>
+            </a:r>
+            <a:r>
+              <a:rPr lang="en-US" sz="1000" b="1" dirty="0" smtClean="0">
+                <a:latin typeface="Arial" panose="020B0604020202020204" pitchFamily="34" charset="0"/>
+                <a:cs typeface="Arial" panose="020B0604020202020204" pitchFamily="34" charset="0"/>
+              </a:rPr>
+              <a:t>Issues</a:t>
             </a:r>
           </a:p>
           <a:p>
@@ -13261,11 +13502,106 @@
               </a:spcAft>
             </a:pPr>
             <a:r>
+              <a:rPr lang="en-US" sz="1000" dirty="0">
+                <a:latin typeface="Arial" panose="020B0604020202020204" pitchFamily="34" charset="0"/>
+                <a:cs typeface="Arial" panose="020B0604020202020204" pitchFamily="34" charset="0"/>
+              </a:rPr>
+              <a:t>There could be minor </a:t>
+            </a:r>
+            <a:r>
               <a:rPr lang="en-US" sz="1000" dirty="0" smtClean="0">
                 <a:latin typeface="Arial" panose="020B0604020202020204" pitchFamily="34" charset="0"/>
                 <a:cs typeface="Arial" panose="020B0604020202020204" pitchFamily="34" charset="0"/>
               </a:rPr>
-              <a:t>An external application of the type used by the Web2Native Bridge would most likely have the same possibilities as any other local application running in the user’s context.</a:t>
+              <a:t>privacy-impediments </a:t>
+            </a:r>
+            <a:r>
+              <a:rPr lang="en-US" sz="1000" dirty="0">
+                <a:latin typeface="Arial" panose="020B0604020202020204" pitchFamily="34" charset="0"/>
+                <a:cs typeface="Arial" panose="020B0604020202020204" pitchFamily="34" charset="0"/>
+              </a:rPr>
+              <a:t>since the invocation mechanism </a:t>
+            </a:r>
+            <a:r>
+              <a:rPr lang="en-US" sz="1000" dirty="0" smtClean="0">
+                <a:latin typeface="Arial" panose="020B0604020202020204" pitchFamily="34" charset="0"/>
+                <a:cs typeface="Arial" panose="020B0604020202020204" pitchFamily="34" charset="0"/>
+              </a:rPr>
+              <a:t>can enable </a:t>
+            </a:r>
+            <a:r>
+              <a:rPr lang="en-US" sz="1000" dirty="0">
+                <a:latin typeface="Arial" panose="020B0604020202020204" pitchFamily="34" charset="0"/>
+                <a:cs typeface="Arial" panose="020B0604020202020204" pitchFamily="34" charset="0"/>
+              </a:rPr>
+              <a:t>additional finger-printing of the client (=finding out that a certain Web2Native Bridge </a:t>
+            </a:r>
+            <a:r>
+              <a:rPr lang="en-US" sz="1000" dirty="0" smtClean="0">
+                <a:latin typeface="Arial" panose="020B0604020202020204" pitchFamily="34" charset="0"/>
+                <a:cs typeface="Arial" panose="020B0604020202020204" pitchFamily="34" charset="0"/>
+              </a:rPr>
+              <a:t>application </a:t>
+            </a:r>
+            <a:r>
+              <a:rPr lang="en-US" sz="1000" dirty="0">
+                <a:latin typeface="Arial" panose="020B0604020202020204" pitchFamily="34" charset="0"/>
+                <a:cs typeface="Arial" panose="020B0604020202020204" pitchFamily="34" charset="0"/>
+              </a:rPr>
+              <a:t>is available</a:t>
+            </a:r>
+            <a:r>
+              <a:rPr lang="en-US" sz="1000" dirty="0" smtClean="0">
+                <a:latin typeface="Arial" panose="020B0604020202020204" pitchFamily="34" charset="0"/>
+                <a:cs typeface="Arial" panose="020B0604020202020204" pitchFamily="34" charset="0"/>
+              </a:rPr>
+              <a:t>).  However, silent enumeration of supported applications MUST NOT be permitted.</a:t>
+            </a:r>
+            <a:endParaRPr lang="en-US" sz="1000" dirty="0">
+              <a:latin typeface="Arial" panose="020B0604020202020204" pitchFamily="34" charset="0"/>
+              <a:cs typeface="Arial" panose="020B0604020202020204" pitchFamily="34" charset="0"/>
+            </a:endParaRPr>
+          </a:p>
+          <a:p>
+            <a:pPr>
+              <a:spcAft>
+                <a:spcPts val="1200"/>
+              </a:spcAft>
+            </a:pPr>
+            <a:r>
+              <a:rPr lang="en-US" sz="1000" dirty="0" smtClean="0">
+                <a:latin typeface="Arial" panose="020B0604020202020204" pitchFamily="34" charset="0"/>
+                <a:cs typeface="Arial" panose="020B0604020202020204" pitchFamily="34" charset="0"/>
+              </a:rPr>
+              <a:t>If the user accidently interacts with another web-site than he/she intended, the user could be tricked providing information which usually isn't intended for arbitrary consumption like an </a:t>
+            </a:r>
+            <a:r>
+              <a:rPr lang="en-US" sz="1000" dirty="0" err="1" smtClean="0">
+                <a:latin typeface="Arial" panose="020B0604020202020204" pitchFamily="34" charset="0"/>
+                <a:cs typeface="Arial" panose="020B0604020202020204" pitchFamily="34" charset="0"/>
+              </a:rPr>
+              <a:t>eID</a:t>
+            </a:r>
+            <a:r>
+              <a:rPr lang="en-US" sz="1000" dirty="0" smtClean="0">
+                <a:latin typeface="Arial" panose="020B0604020202020204" pitchFamily="34" charset="0"/>
+                <a:cs typeface="Arial" panose="020B0604020202020204" pitchFamily="34" charset="0"/>
+              </a:rPr>
+              <a:t> certificate containing a citizen ID.   An </a:t>
+            </a:r>
+            <a:r>
+              <a:rPr lang="en-US" sz="1000" dirty="0">
+                <a:latin typeface="Arial" panose="020B0604020202020204" pitchFamily="34" charset="0"/>
+                <a:cs typeface="Arial" panose="020B0604020202020204" pitchFamily="34" charset="0"/>
+              </a:rPr>
+              <a:t>identity-related Web2Native Bridge application </a:t>
+            </a:r>
+            <a:r>
+              <a:rPr lang="en-US" sz="1000" dirty="0" smtClean="0">
+                <a:latin typeface="Arial" panose="020B0604020202020204" pitchFamily="34" charset="0"/>
+                <a:cs typeface="Arial" panose="020B0604020202020204" pitchFamily="34" charset="0"/>
+              </a:rPr>
+              <a:t>SHOULD therefore inform users about previously not encountered sites.</a:t>
             </a:r>
           </a:p>
           <a:p>
@@ -13275,332 +13611,60 @@
               </a:spcAft>
             </a:pPr>
             <a:r>
+              <a:rPr lang="en-US" sz="1000" b="1" dirty="0" smtClean="0">
+                <a:latin typeface="Arial" panose="020B0604020202020204" pitchFamily="34" charset="0"/>
+                <a:cs typeface="Arial" panose="020B0604020202020204" pitchFamily="34" charset="0"/>
+              </a:rPr>
+              <a:t>Application Vetting</a:t>
+            </a:r>
+          </a:p>
+          <a:p>
+            <a:r>
               <a:rPr lang="en-US" sz="1000" dirty="0" smtClean="0">
                 <a:latin typeface="Arial" panose="020B0604020202020204" pitchFamily="34" charset="0"/>
                 <a:cs typeface="Arial" panose="020B0604020202020204" pitchFamily="34" charset="0"/>
               </a:rPr>
-              <a:t>In contrast to traditional local applications, </a:t>
-            </a:r>
-            <a:r>
-              <a:rPr lang="en-US" sz="1000" i="1" dirty="0" smtClean="0">
-                <a:latin typeface="Arial" panose="020B0604020202020204" pitchFamily="34" charset="0"/>
-                <a:cs typeface="Arial" panose="020B0604020202020204" pitchFamily="34" charset="0"/>
-              </a:rPr>
-              <a:t>Web2Native Bridge applications can typically be invoked by any web-site</a:t>
+              <a:t>In addition to the intrinsic security features, a </a:t>
             </a:r>
             <a:r>
               <a:rPr lang="en-US" sz="1000" dirty="0" smtClean="0">
                 <a:latin typeface="Arial" panose="020B0604020202020204" pitchFamily="34" charset="0"/>
                 <a:cs typeface="Arial" panose="020B0604020202020204" pitchFamily="34" charset="0"/>
               </a:rPr>
-              <a:t>.  For large-scale usage, such applications MUST therefore be vetted in a specific way to avoid potential security or privacy violations.  That is, it MUST NOT be possible invoking trust-wise unknown Web2Native Bridge applications except for development purposes.  Also see </a:t>
-            </a:r>
-            <a:r>
-              <a:rPr lang="en-US" sz="1000" dirty="0">
-                <a:latin typeface="Arial" panose="020B0604020202020204" pitchFamily="34" charset="0"/>
-                <a:cs typeface="Arial" panose="020B0604020202020204" pitchFamily="34" charset="0"/>
-                <a:hlinkClick r:id="rId2" action="ppaction://hlinksldjump"/>
-              </a:rPr>
-              <a:t>HTTPS </a:t>
+              <a:t>party performing </a:t>
             </a:r>
             <a:r>
               <a:rPr lang="en-US" sz="1000" dirty="0" smtClean="0">
                 <a:latin typeface="Arial" panose="020B0604020202020204" pitchFamily="34" charset="0"/>
                 <a:cs typeface="Arial" panose="020B0604020202020204" pitchFamily="34" charset="0"/>
-                <a:hlinkClick r:id="rId2" action="ppaction://hlinksldjump"/>
-              </a:rPr>
-              <a:t>CCA</a:t>
+              </a:rPr>
+              <a:t>vetting may further restrict usage of certain applications </a:t>
             </a:r>
             <a:r>
               <a:rPr lang="en-US" sz="1000" dirty="0" smtClean="0">
                 <a:latin typeface="Arial" panose="020B0604020202020204" pitchFamily="34" charset="0"/>
                 <a:cs typeface="Arial" panose="020B0604020202020204" pitchFamily="34" charset="0"/>
               </a:rPr>
-              <a:t>.</a:t>
-            </a:r>
-          </a:p>
-          <a:p>
-            <a:pPr>
-              <a:spcAft>
-                <a:spcPts val="600"/>
-              </a:spcAft>
-            </a:pPr>
+              <a:t>and/or </a:t>
+            </a:r>
             <a:r>
               <a:rPr lang="en-US" sz="1000" dirty="0" smtClean="0">
                 <a:latin typeface="Arial" panose="020B0604020202020204" pitchFamily="34" charset="0"/>
                 <a:cs typeface="Arial" panose="020B0604020202020204" pitchFamily="34" charset="0"/>
               </a:rPr>
-              <a:t>Web2Native </a:t>
-            </a:r>
-            <a:r>
-              <a:rPr lang="en-US" sz="1000" dirty="0">
-                <a:latin typeface="Arial" panose="020B0604020202020204" pitchFamily="34" charset="0"/>
-                <a:cs typeface="Arial" panose="020B0604020202020204" pitchFamily="34" charset="0"/>
-              </a:rPr>
-              <a:t>Bridge </a:t>
+              <a:t>impose special requirements on </a:t>
             </a:r>
             <a:r>
               <a:rPr lang="en-US" sz="1000" dirty="0" smtClean="0">
                 <a:latin typeface="Arial" panose="020B0604020202020204" pitchFamily="34" charset="0"/>
                 <a:cs typeface="Arial" panose="020B0604020202020204" pitchFamily="34" charset="0"/>
               </a:rPr>
-              <a:t>invocation requests MUST be derivable to secure origins (authenticated by HTTPS).</a:t>
-            </a:r>
-          </a:p>
-          <a:p>
-            <a:pPr>
-              <a:spcAft>
-                <a:spcPts val="600"/>
-              </a:spcAft>
-            </a:pPr>
-            <a:r>
-              <a:rPr lang="en-US" sz="1000" dirty="0" smtClean="0">
-                <a:latin typeface="Arial" panose="020B0604020202020204" pitchFamily="34" charset="0"/>
-                <a:cs typeface="Arial" panose="020B0604020202020204" pitchFamily="34" charset="0"/>
-              </a:rPr>
-              <a:t>Web2Native Bridge applications MUST in a clear way inform users what is requested as well as including the ability to cancel the request and possibly also offering an option to block</a:t>
-            </a:r>
-            <a:r>
-              <a:rPr lang="en-US" sz="1000" dirty="0">
-                <a:latin typeface="Arial" panose="020B0604020202020204" pitchFamily="34" charset="0"/>
-                <a:cs typeface="Arial" panose="020B0604020202020204" pitchFamily="34" charset="0"/>
-              </a:rPr>
-              <a:t>.</a:t>
+              <a:t>developers.</a:t>
             </a:r>
             <a:endParaRPr lang="en-US" sz="1000" dirty="0" smtClean="0">
               <a:latin typeface="Arial" panose="020B0604020202020204" pitchFamily="34" charset="0"/>
               <a:cs typeface="Arial" panose="020B0604020202020204" pitchFamily="34" charset="0"/>
             </a:endParaRPr>
-          </a:p>
-          <a:p>
-            <a:pPr>
-              <a:spcAft>
-                <a:spcPts val="600"/>
-              </a:spcAft>
-            </a:pPr>
-            <a:r>
-              <a:rPr lang="en-US" sz="1000" dirty="0" smtClean="0">
-                <a:latin typeface="Arial" panose="020B0604020202020204" pitchFamily="34" charset="0"/>
-                <a:cs typeface="Arial" panose="020B0604020202020204" pitchFamily="34" charset="0"/>
-              </a:rPr>
-              <a:t>Each Web2Native </a:t>
-            </a:r>
-            <a:r>
-              <a:rPr lang="en-US" sz="1000" dirty="0">
-                <a:latin typeface="Arial" panose="020B0604020202020204" pitchFamily="34" charset="0"/>
-                <a:cs typeface="Arial" panose="020B0604020202020204" pitchFamily="34" charset="0"/>
-              </a:rPr>
-              <a:t>Bridge </a:t>
-            </a:r>
-            <a:r>
-              <a:rPr lang="en-US" sz="1000" dirty="0" smtClean="0">
-                <a:latin typeface="Arial" panose="020B0604020202020204" pitchFamily="34" charset="0"/>
-                <a:cs typeface="Arial" panose="020B0604020202020204" pitchFamily="34" charset="0"/>
-              </a:rPr>
-              <a:t>application exposes a specific interface based on messages passed through the </a:t>
-            </a:r>
-            <a:r>
-              <a:rPr lang="en-US" sz="1000" dirty="0">
-                <a:latin typeface="Arial" panose="020B0604020202020204" pitchFamily="34" charset="0"/>
-                <a:cs typeface="Arial" panose="020B0604020202020204" pitchFamily="34" charset="0"/>
-              </a:rPr>
-              <a:t>Web2Native Bridge </a:t>
-            </a:r>
-            <a:r>
-              <a:rPr lang="en-US" sz="1000" dirty="0" smtClean="0">
-                <a:latin typeface="Arial" panose="020B0604020202020204" pitchFamily="34" charset="0"/>
-                <a:cs typeface="Arial" panose="020B0604020202020204" pitchFamily="34" charset="0"/>
-              </a:rPr>
-              <a:t>channel. </a:t>
-            </a:r>
-            <a:r>
-              <a:rPr lang="en-US" sz="1000" dirty="0">
-                <a:latin typeface="Arial" panose="020B0604020202020204" pitchFamily="34" charset="0"/>
-                <a:cs typeface="Arial" panose="020B0604020202020204" pitchFamily="34" charset="0"/>
-              </a:rPr>
-              <a:t>Web2Native Bridge </a:t>
-            </a:r>
-            <a:r>
-              <a:rPr lang="en-US" sz="1000" dirty="0" smtClean="0">
-                <a:latin typeface="Arial" panose="020B0604020202020204" pitchFamily="34" charset="0"/>
-                <a:cs typeface="Arial" panose="020B0604020202020204" pitchFamily="34" charset="0"/>
-              </a:rPr>
-              <a:t>applications MUST verify the correctness of inbound messages and immediately abort execution if there is a mismatch.</a:t>
-            </a:r>
-          </a:p>
-          <a:p>
-            <a:pPr>
-              <a:spcAft>
-                <a:spcPts val="1200"/>
-              </a:spcAft>
-            </a:pPr>
-            <a:r>
-              <a:rPr lang="en-US" sz="1000" dirty="0" smtClean="0">
-                <a:latin typeface="Arial" panose="020B0604020202020204" pitchFamily="34" charset="0"/>
-                <a:cs typeface="Arial" panose="020B0604020202020204" pitchFamily="34" charset="0"/>
-              </a:rPr>
-              <a:t>A Web2Native </a:t>
-            </a:r>
-            <a:r>
-              <a:rPr lang="en-US" sz="1000" dirty="0">
-                <a:latin typeface="Arial" panose="020B0604020202020204" pitchFamily="34" charset="0"/>
-                <a:cs typeface="Arial" panose="020B0604020202020204" pitchFamily="34" charset="0"/>
-              </a:rPr>
-              <a:t>Bridge </a:t>
-            </a:r>
-            <a:r>
-              <a:rPr lang="en-US" sz="1000" dirty="0" smtClean="0">
-                <a:latin typeface="Arial" panose="020B0604020202020204" pitchFamily="34" charset="0"/>
-                <a:cs typeface="Arial" panose="020B0604020202020204" pitchFamily="34" charset="0"/>
-              </a:rPr>
-              <a:t>application MAY restrict access by requiring callers performing something to prove their “membership” or similar.</a:t>
-            </a:r>
-          </a:p>
-          <a:p>
-            <a:pPr>
-              <a:spcAft>
-                <a:spcPts val="600"/>
-              </a:spcAft>
-            </a:pPr>
-            <a:r>
-              <a:rPr lang="en-US" sz="1000" b="1" dirty="0" smtClean="0">
-                <a:latin typeface="Arial" panose="020B0604020202020204" pitchFamily="34" charset="0"/>
-                <a:cs typeface="Arial" panose="020B0604020202020204" pitchFamily="34" charset="0"/>
-              </a:rPr>
-              <a:t>Privacy Issues</a:t>
-            </a:r>
-          </a:p>
-          <a:p>
-            <a:pPr>
-              <a:spcAft>
-                <a:spcPts val="600"/>
-              </a:spcAft>
-            </a:pPr>
-            <a:r>
-              <a:rPr lang="en-US" sz="1000" dirty="0">
-                <a:latin typeface="Arial" panose="020B0604020202020204" pitchFamily="34" charset="0"/>
-                <a:cs typeface="Arial" panose="020B0604020202020204" pitchFamily="34" charset="0"/>
-              </a:rPr>
-              <a:t>There could be minor </a:t>
-            </a:r>
-            <a:r>
-              <a:rPr lang="en-US" sz="1000" dirty="0" smtClean="0">
-                <a:latin typeface="Arial" panose="020B0604020202020204" pitchFamily="34" charset="0"/>
-                <a:cs typeface="Arial" panose="020B0604020202020204" pitchFamily="34" charset="0"/>
-              </a:rPr>
-              <a:t>privacy-impediments </a:t>
-            </a:r>
-            <a:r>
-              <a:rPr lang="en-US" sz="1000" dirty="0">
-                <a:latin typeface="Arial" panose="020B0604020202020204" pitchFamily="34" charset="0"/>
-                <a:cs typeface="Arial" panose="020B0604020202020204" pitchFamily="34" charset="0"/>
-              </a:rPr>
-              <a:t>since the invocation mechanism </a:t>
-            </a:r>
-            <a:r>
-              <a:rPr lang="en-US" sz="1000" dirty="0" smtClean="0">
-                <a:latin typeface="Arial" panose="020B0604020202020204" pitchFamily="34" charset="0"/>
-                <a:cs typeface="Arial" panose="020B0604020202020204" pitchFamily="34" charset="0"/>
-              </a:rPr>
-              <a:t>can enable </a:t>
-            </a:r>
-            <a:r>
-              <a:rPr lang="en-US" sz="1000" dirty="0">
-                <a:latin typeface="Arial" panose="020B0604020202020204" pitchFamily="34" charset="0"/>
-                <a:cs typeface="Arial" panose="020B0604020202020204" pitchFamily="34" charset="0"/>
-              </a:rPr>
-              <a:t>additional finger-printing of the client (=finding out that a certain Web2Native Bridge </a:t>
-            </a:r>
-            <a:r>
-              <a:rPr lang="en-US" sz="1000" dirty="0" smtClean="0">
-                <a:latin typeface="Arial" panose="020B0604020202020204" pitchFamily="34" charset="0"/>
-                <a:cs typeface="Arial" panose="020B0604020202020204" pitchFamily="34" charset="0"/>
-              </a:rPr>
-              <a:t>application </a:t>
-            </a:r>
-            <a:r>
-              <a:rPr lang="en-US" sz="1000" dirty="0">
-                <a:latin typeface="Arial" panose="020B0604020202020204" pitchFamily="34" charset="0"/>
-                <a:cs typeface="Arial" panose="020B0604020202020204" pitchFamily="34" charset="0"/>
-              </a:rPr>
-              <a:t>is available</a:t>
-            </a:r>
-            <a:r>
-              <a:rPr lang="en-US" sz="1000" dirty="0" smtClean="0">
-                <a:latin typeface="Arial" panose="020B0604020202020204" pitchFamily="34" charset="0"/>
-                <a:cs typeface="Arial" panose="020B0604020202020204" pitchFamily="34" charset="0"/>
-              </a:rPr>
-              <a:t>).  However, silent enumeration of supported applications MUST NOT be permitted.</a:t>
-            </a:r>
-            <a:endParaRPr lang="en-US" sz="1000" dirty="0">
-              <a:latin typeface="Arial" panose="020B0604020202020204" pitchFamily="34" charset="0"/>
-              <a:cs typeface="Arial" panose="020B0604020202020204" pitchFamily="34" charset="0"/>
-            </a:endParaRPr>
-          </a:p>
-          <a:p>
-            <a:pPr>
-              <a:spcAft>
-                <a:spcPts val="1200"/>
-              </a:spcAft>
-            </a:pPr>
-            <a:r>
-              <a:rPr lang="en-US" sz="1000" dirty="0" smtClean="0">
-                <a:latin typeface="Arial" panose="020B0604020202020204" pitchFamily="34" charset="0"/>
-                <a:cs typeface="Arial" panose="020B0604020202020204" pitchFamily="34" charset="0"/>
-              </a:rPr>
-              <a:t>If the user accidently interacts with another web-site than he/she intended, the user could be tricked providing information which usually isn't intended for arbitrary consumption like an </a:t>
-            </a:r>
-            <a:r>
-              <a:rPr lang="en-US" sz="1000" dirty="0" err="1" smtClean="0">
-                <a:latin typeface="Arial" panose="020B0604020202020204" pitchFamily="34" charset="0"/>
-                <a:cs typeface="Arial" panose="020B0604020202020204" pitchFamily="34" charset="0"/>
-              </a:rPr>
-              <a:t>eID</a:t>
-            </a:r>
-            <a:r>
-              <a:rPr lang="en-US" sz="1000" dirty="0" smtClean="0">
-                <a:latin typeface="Arial" panose="020B0604020202020204" pitchFamily="34" charset="0"/>
-                <a:cs typeface="Arial" panose="020B0604020202020204" pitchFamily="34" charset="0"/>
-              </a:rPr>
-              <a:t> certificate containing a citizen ID.   An </a:t>
-            </a:r>
-            <a:r>
-              <a:rPr lang="en-US" sz="1000" dirty="0">
-                <a:latin typeface="Arial" panose="020B0604020202020204" pitchFamily="34" charset="0"/>
-                <a:cs typeface="Arial" panose="020B0604020202020204" pitchFamily="34" charset="0"/>
-              </a:rPr>
-              <a:t>identity-related Web2Native Bridge application </a:t>
-            </a:r>
-            <a:r>
-              <a:rPr lang="en-US" sz="1000" dirty="0" smtClean="0">
-                <a:latin typeface="Arial" panose="020B0604020202020204" pitchFamily="34" charset="0"/>
-                <a:cs typeface="Arial" panose="020B0604020202020204" pitchFamily="34" charset="0"/>
-              </a:rPr>
-              <a:t>SHOULD therefore inform users about previously not encountered sites.</a:t>
-            </a:r>
-          </a:p>
-          <a:p>
-            <a:pPr>
-              <a:spcAft>
-                <a:spcPts val="600"/>
-              </a:spcAft>
-            </a:pPr>
-            <a:r>
-              <a:rPr lang="en-US" sz="1000" b="1" dirty="0" smtClean="0">
-                <a:latin typeface="Arial" panose="020B0604020202020204" pitchFamily="34" charset="0"/>
-                <a:cs typeface="Arial" panose="020B0604020202020204" pitchFamily="34" charset="0"/>
-              </a:rPr>
-              <a:t>Application Vetting</a:t>
-            </a:r>
-          </a:p>
-          <a:p>
-            <a:r>
-              <a:rPr lang="en-US" sz="1000" dirty="0" smtClean="0">
-                <a:latin typeface="Arial" panose="020B0604020202020204" pitchFamily="34" charset="0"/>
-                <a:cs typeface="Arial" panose="020B0604020202020204" pitchFamily="34" charset="0"/>
-              </a:rPr>
-              <a:t>In addition to the intrinsic security features, a vendor performing vetting may further restrict usage of certain applications or impose special requirements on developers.</a:t>
-            </a:r>
           </a:p>
         </p:txBody>
       </p:sp>

</xml_diff>

<commit_message>
added reference to Chrome Native Messaging and W3C Web Messaging
</commit_message>
<xml_diff>
--- a/resources/docs/web2native-bridge.pptx
+++ b/resources/docs/web2native-bridge.pptx
@@ -3283,8 +3283,19 @@
                 <a:latin typeface="Arial" panose="020B0604020202020204" pitchFamily="34" charset="0"/>
                 <a:cs typeface="Arial" panose="020B0604020202020204" pitchFamily="34" charset="0"/>
               </a:rPr>
-              <a:t>, WebPKI.org, V0.98, 2015-04-18</a:t>
-            </a:r>
+              <a:t>, WebPKI.org, </a:t>
+            </a:r>
+            <a:r>
+              <a:rPr lang="en-US" sz="600" baseline="0" dirty="0" smtClean="0">
+                <a:latin typeface="Arial" panose="020B0604020202020204" pitchFamily="34" charset="0"/>
+                <a:cs typeface="Arial" panose="020B0604020202020204" pitchFamily="34" charset="0"/>
+              </a:rPr>
+              <a:t>V0.99, 2015-04-28</a:t>
+            </a:r>
+            <a:endParaRPr lang="en-US" sz="600" baseline="0" dirty="0" smtClean="0">
+              <a:latin typeface="Arial" panose="020B0604020202020204" pitchFamily="34" charset="0"/>
+              <a:cs typeface="Arial" panose="020B0604020202020204" pitchFamily="34" charset="0"/>
+            </a:endParaRPr>
           </a:p>
         </p:txBody>
       </p:sp>
@@ -3712,7 +3723,7 @@
         </p:nvSpPr>
         <p:spPr>
           <a:xfrm>
-            <a:off x="2501705" y="1195513"/>
+            <a:off x="2501705" y="1051497"/>
             <a:ext cx="4142481" cy="643253"/>
           </a:xfrm>
           <a:prstGeom prst="rect">
@@ -3776,8 +3787,8 @@
         </p:nvSpPr>
         <p:spPr>
           <a:xfrm>
-            <a:off x="955174" y="1987602"/>
-            <a:ext cx="7258000" cy="3345834"/>
+            <a:off x="955174" y="1772816"/>
+            <a:ext cx="7258000" cy="3711514"/>
           </a:xfrm>
           <a:prstGeom prst="roundRect">
             <a:avLst>
@@ -4074,6 +4085,11 @@
             </a:r>
           </a:p>
           <a:p>
+            <a:pPr>
+              <a:spcAft>
+                <a:spcPts val="800"/>
+              </a:spcAft>
+            </a:pPr>
             <a:r>
               <a:rPr lang="en-US" sz="1600" dirty="0" smtClean="0">
                 <a:latin typeface="Arial" panose="020B0604020202020204" pitchFamily="34" charset="0"/>
@@ -4102,6 +4118,34 @@
               </a:rPr>
               <a:t>.</a:t>
             </a:r>
+          </a:p>
+          <a:p>
+            <a:r>
+              <a:rPr lang="en-US" sz="1600" dirty="0" smtClean="0">
+                <a:latin typeface="Arial" panose="020B0604020202020204" pitchFamily="34" charset="0"/>
+                <a:cs typeface="Arial" panose="020B0604020202020204" pitchFamily="34" charset="0"/>
+              </a:rPr>
+              <a:t>This proposal is a enhanced version of </a:t>
+            </a:r>
+            <a:r>
+              <a:rPr lang="en-US" sz="1600" dirty="0" smtClean="0">
+                <a:latin typeface="Arial" panose="020B0604020202020204" pitchFamily="34" charset="0"/>
+                <a:cs typeface="Arial" panose="020B0604020202020204" pitchFamily="34" charset="0"/>
+                <a:hlinkClick r:id="rId2" action="ppaction://hlinksldjump"/>
+              </a:rPr>
+              <a:t>Chrome’s Native Messaging</a:t>
+            </a:r>
+            <a:r>
+              <a:rPr lang="en-US" sz="1600" dirty="0" smtClean="0">
+                <a:latin typeface="Arial" panose="020B0604020202020204" pitchFamily="34" charset="0"/>
+                <a:cs typeface="Arial" panose="020B0604020202020204" pitchFamily="34" charset="0"/>
+              </a:rPr>
+              <a:t>.</a:t>
+            </a:r>
+            <a:endParaRPr lang="en-US" sz="1600" dirty="0" smtClean="0">
+              <a:latin typeface="Arial" panose="020B0604020202020204" pitchFamily="34" charset="0"/>
+              <a:cs typeface="Arial" panose="020B0604020202020204" pitchFamily="34" charset="0"/>
+            </a:endParaRPr>
           </a:p>
         </p:txBody>
       </p:sp>
@@ -4164,7 +4208,7 @@
         </p:nvSpPr>
         <p:spPr>
           <a:xfrm>
-            <a:off x="683568" y="5517232"/>
+            <a:off x="683568" y="5586625"/>
             <a:ext cx="7673622" cy="938719"/>
           </a:xfrm>
           <a:prstGeom prst="rect">
@@ -4266,7 +4310,7 @@
         </p:nvSpPr>
         <p:spPr>
           <a:xfrm>
-            <a:off x="2860400" y="620688"/>
+            <a:off x="2860400" y="476672"/>
             <a:ext cx="3447547" cy="643253"/>
           </a:xfrm>
           <a:prstGeom prst="rect">
@@ -12477,8 +12521,27 @@
                 <a:latin typeface="Arial" panose="020B0604020202020204" pitchFamily="34" charset="0"/>
                 <a:cs typeface="Arial" panose="020B0604020202020204" pitchFamily="34" charset="0"/>
               </a:rPr>
-              <a:t>Channel API</a:t>
-            </a:r>
+              <a:t>Channel </a:t>
+            </a:r>
+            <a:r>
+              <a:rPr lang="en-US" sz="1400" dirty="0" smtClean="0">
+                <a:latin typeface="Arial" panose="020B0604020202020204" pitchFamily="34" charset="0"/>
+                <a:cs typeface="Arial" panose="020B0604020202020204" pitchFamily="34" charset="0"/>
+              </a:rPr>
+              <a:t>API.  Most likely modelled after </a:t>
+            </a:r>
+            <a:r>
+              <a:rPr lang="en-US" sz="1400" dirty="0" smtClean="0">
+                <a:latin typeface="Arial" panose="020B0604020202020204" pitchFamily="34" charset="0"/>
+                <a:cs typeface="Arial" panose="020B0604020202020204" pitchFamily="34" charset="0"/>
+                <a:hlinkClick r:id="rId2"/>
+              </a:rPr>
+              <a:t>http://www.w3.org/TR/webmessaging/</a:t>
+            </a:r>
+            <a:endParaRPr lang="en-US" sz="1400" dirty="0" smtClean="0">
+              <a:latin typeface="Arial" panose="020B0604020202020204" pitchFamily="34" charset="0"/>
+              <a:cs typeface="Arial" panose="020B0604020202020204" pitchFamily="34" charset="0"/>
+            </a:endParaRPr>
           </a:p>
           <a:p>
             <a:pPr marL="285750" indent="-285750">
@@ -13009,14 +13072,7 @@
                 <a:latin typeface="Arial" panose="020B0604020202020204" pitchFamily="34" charset="0"/>
                 <a:cs typeface="Arial" panose="020B0604020202020204" pitchFamily="34" charset="0"/>
               </a:rPr>
-              <a:t>Browser </a:t>
-            </a:r>
-            <a:r>
-              <a:rPr lang="en-US" sz="1000" b="1" dirty="0" smtClean="0">
-                <a:latin typeface="Arial" panose="020B0604020202020204" pitchFamily="34" charset="0"/>
-                <a:cs typeface="Arial" panose="020B0604020202020204" pitchFamily="34" charset="0"/>
-              </a:rPr>
-              <a:t>Security</a:t>
+              <a:t>Browser Security</a:t>
             </a:r>
           </a:p>
           <a:p>
@@ -13065,21 +13121,7 @@
                 <a:latin typeface="Arial" panose="020B0604020202020204" pitchFamily="34" charset="0"/>
                 <a:cs typeface="Arial" panose="020B0604020202020204" pitchFamily="34" charset="0"/>
               </a:rPr>
-              <a:t> (local) applications through a new interface (TBD).  This does not in itself present a risk </a:t>
-            </a:r>
-            <a:r>
-              <a:rPr lang="en-US" sz="1000" dirty="0" smtClean="0">
-                <a:latin typeface="Arial" panose="020B0604020202020204" pitchFamily="34" charset="0"/>
-                <a:cs typeface="Arial" panose="020B0604020202020204" pitchFamily="34" charset="0"/>
-              </a:rPr>
-              <a:t>specifically to </a:t>
-            </a:r>
-            <a:r>
-              <a:rPr lang="en-US" sz="1000" dirty="0" smtClean="0">
-                <a:latin typeface="Arial" panose="020B0604020202020204" pitchFamily="34" charset="0"/>
-                <a:cs typeface="Arial" panose="020B0604020202020204" pitchFamily="34" charset="0"/>
-              </a:rPr>
-              <a:t>the </a:t>
+              <a:t> (local) applications through a new interface (TBD).  This does not in itself present a risk specifically to the </a:t>
             </a:r>
             <a:r>
               <a:rPr lang="en-US" sz="1000" i="1" dirty="0" smtClean="0">
@@ -13174,19 +13216,8 @@
                 <a:latin typeface="Arial" panose="020B0604020202020204" pitchFamily="34" charset="0"/>
                 <a:cs typeface="Arial" panose="020B0604020202020204" pitchFamily="34" charset="0"/>
               </a:rPr>
-              <a:t> </a:t>
-            </a:r>
-            <a:r>
-              <a:rPr lang="en-US" sz="1000" dirty="0" smtClean="0">
-                <a:latin typeface="Arial" panose="020B0604020202020204" pitchFamily="34" charset="0"/>
-                <a:cs typeface="Arial" panose="020B0604020202020204" pitchFamily="34" charset="0"/>
-              </a:rPr>
-              <a:t>methods.</a:t>
-            </a:r>
-            <a:endParaRPr lang="en-US" sz="1000" dirty="0" smtClean="0">
-              <a:latin typeface="Arial" panose="020B0604020202020204" pitchFamily="34" charset="0"/>
-              <a:cs typeface="Arial" panose="020B0604020202020204" pitchFamily="34" charset="0"/>
-            </a:endParaRPr>
+              <a:t> methods.</a:t>
+            </a:r>
           </a:p>
           <a:p>
             <a:pPr>
@@ -13429,49 +13460,21 @@
                 <a:latin typeface="Arial" panose="020B0604020202020204" pitchFamily="34" charset="0"/>
                 <a:cs typeface="Arial" panose="020B0604020202020204" pitchFamily="34" charset="0"/>
               </a:rPr>
-              <a:t>A </a:t>
+              <a:t>A Web2Native </a:t>
+            </a:r>
+            <a:r>
+              <a:rPr lang="en-US" sz="1000" dirty="0">
+                <a:latin typeface="Arial" panose="020B0604020202020204" pitchFamily="34" charset="0"/>
+                <a:cs typeface="Arial" panose="020B0604020202020204" pitchFamily="34" charset="0"/>
+              </a:rPr>
+              <a:t>Bridge </a:t>
             </a:r>
             <a:r>
               <a:rPr lang="en-US" sz="1000" dirty="0" smtClean="0">
                 <a:latin typeface="Arial" panose="020B0604020202020204" pitchFamily="34" charset="0"/>
                 <a:cs typeface="Arial" panose="020B0604020202020204" pitchFamily="34" charset="0"/>
               </a:rPr>
-              <a:t>Web2Native </a:t>
-            </a:r>
-            <a:r>
-              <a:rPr lang="en-US" sz="1000" dirty="0">
-                <a:latin typeface="Arial" panose="020B0604020202020204" pitchFamily="34" charset="0"/>
-                <a:cs typeface="Arial" panose="020B0604020202020204" pitchFamily="34" charset="0"/>
-              </a:rPr>
-              <a:t>Bridge </a:t>
-            </a:r>
-            <a:r>
-              <a:rPr lang="en-US" sz="1000" dirty="0" smtClean="0">
-                <a:latin typeface="Arial" panose="020B0604020202020204" pitchFamily="34" charset="0"/>
-                <a:cs typeface="Arial" panose="020B0604020202020204" pitchFamily="34" charset="0"/>
-              </a:rPr>
-              <a:t>application MAY restrict access by requiring </a:t>
-            </a:r>
-            <a:r>
-              <a:rPr lang="en-US" sz="1000" dirty="0" smtClean="0">
-                <a:latin typeface="Arial" panose="020B0604020202020204" pitchFamily="34" charset="0"/>
-                <a:cs typeface="Arial" panose="020B0604020202020204" pitchFamily="34" charset="0"/>
-              </a:rPr>
-              <a:t>callers proving </a:t>
-            </a:r>
-            <a:r>
-              <a:rPr lang="en-US" sz="1000" dirty="0" smtClean="0">
-                <a:latin typeface="Arial" panose="020B0604020202020204" pitchFamily="34" charset="0"/>
-                <a:cs typeface="Arial" panose="020B0604020202020204" pitchFamily="34" charset="0"/>
-              </a:rPr>
-              <a:t>their “membership” or similar</a:t>
-            </a:r>
-            <a:r>
-              <a:rPr lang="en-US" sz="1000" dirty="0" smtClean="0">
-                <a:latin typeface="Arial" panose="020B0604020202020204" pitchFamily="34" charset="0"/>
-                <a:cs typeface="Arial" panose="020B0604020202020204" pitchFamily="34" charset="0"/>
-              </a:rPr>
-              <a:t>.</a:t>
+              <a:t>application MAY restrict access by requiring callers proving their “membership” or similar.</a:t>
             </a:r>
           </a:p>
           <a:p>
@@ -13485,14 +13488,7 @@
                 <a:latin typeface="Arial" panose="020B0604020202020204" pitchFamily="34" charset="0"/>
                 <a:cs typeface="Arial" panose="020B0604020202020204" pitchFamily="34" charset="0"/>
               </a:rPr>
-              <a:t>Privacy </a:t>
-            </a:r>
-            <a:r>
-              <a:rPr lang="en-US" sz="1000" b="1" dirty="0" smtClean="0">
-                <a:latin typeface="Arial" panose="020B0604020202020204" pitchFamily="34" charset="0"/>
-                <a:cs typeface="Arial" panose="020B0604020202020204" pitchFamily="34" charset="0"/>
-              </a:rPr>
-              <a:t>Issues</a:t>
+              <a:t>Privacy Issues</a:t>
             </a:r>
           </a:p>
           <a:p>
@@ -13624,47 +13620,8 @@
                 <a:latin typeface="Arial" panose="020B0604020202020204" pitchFamily="34" charset="0"/>
                 <a:cs typeface="Arial" panose="020B0604020202020204" pitchFamily="34" charset="0"/>
               </a:rPr>
-              <a:t>In addition to the intrinsic security features, a </a:t>
-            </a:r>
-            <a:r>
-              <a:rPr lang="en-US" sz="1000" dirty="0" smtClean="0">
-                <a:latin typeface="Arial" panose="020B0604020202020204" pitchFamily="34" charset="0"/>
-                <a:cs typeface="Arial" panose="020B0604020202020204" pitchFamily="34" charset="0"/>
-              </a:rPr>
-              <a:t>party performing </a:t>
-            </a:r>
-            <a:r>
-              <a:rPr lang="en-US" sz="1000" dirty="0" smtClean="0">
-                <a:latin typeface="Arial" panose="020B0604020202020204" pitchFamily="34" charset="0"/>
-                <a:cs typeface="Arial" panose="020B0604020202020204" pitchFamily="34" charset="0"/>
-              </a:rPr>
-              <a:t>vetting may further restrict usage of certain applications </a:t>
-            </a:r>
-            <a:r>
-              <a:rPr lang="en-US" sz="1000" dirty="0" smtClean="0">
-                <a:latin typeface="Arial" panose="020B0604020202020204" pitchFamily="34" charset="0"/>
-                <a:cs typeface="Arial" panose="020B0604020202020204" pitchFamily="34" charset="0"/>
-              </a:rPr>
-              <a:t>and/or </a:t>
-            </a:r>
-            <a:r>
-              <a:rPr lang="en-US" sz="1000" dirty="0" smtClean="0">
-                <a:latin typeface="Arial" panose="020B0604020202020204" pitchFamily="34" charset="0"/>
-                <a:cs typeface="Arial" panose="020B0604020202020204" pitchFamily="34" charset="0"/>
-              </a:rPr>
-              <a:t>impose special requirements on </a:t>
-            </a:r>
-            <a:r>
-              <a:rPr lang="en-US" sz="1000" dirty="0" smtClean="0">
-                <a:latin typeface="Arial" panose="020B0604020202020204" pitchFamily="34" charset="0"/>
-                <a:cs typeface="Arial" panose="020B0604020202020204" pitchFamily="34" charset="0"/>
-              </a:rPr>
-              <a:t>developers.</a:t>
-            </a:r>
-            <a:endParaRPr lang="en-US" sz="1000" dirty="0" smtClean="0">
-              <a:latin typeface="Arial" panose="020B0604020202020204" pitchFamily="34" charset="0"/>
-              <a:cs typeface="Arial" panose="020B0604020202020204" pitchFamily="34" charset="0"/>
-            </a:endParaRPr>
+              <a:t>In addition to the intrinsic security features, a party performing vetting may further restrict usage of certain applications and/or impose special requirements on developers.</a:t>
+            </a:r>
           </a:p>
         </p:txBody>
       </p:sp>

</xml_diff>

<commit_message>
Typo on the first page :-(
</commit_message>
<xml_diff>
--- a/resources/docs/web2native-bridge.pptx
+++ b/resources/docs/web2native-bridge.pptx
@@ -3283,19 +3283,8 @@
                 <a:latin typeface="Arial" panose="020B0604020202020204" pitchFamily="34" charset="0"/>
                 <a:cs typeface="Arial" panose="020B0604020202020204" pitchFamily="34" charset="0"/>
               </a:rPr>
-              <a:t>, WebPKI.org, </a:t>
-            </a:r>
-            <a:r>
-              <a:rPr lang="en-US" sz="600" baseline="0" dirty="0" smtClean="0">
-                <a:latin typeface="Arial" panose="020B0604020202020204" pitchFamily="34" charset="0"/>
-                <a:cs typeface="Arial" panose="020B0604020202020204" pitchFamily="34" charset="0"/>
-              </a:rPr>
-              <a:t>V0.99, 2015-04-28</a:t>
-            </a:r>
-            <a:endParaRPr lang="en-US" sz="600" baseline="0" dirty="0" smtClean="0">
-              <a:latin typeface="Arial" panose="020B0604020202020204" pitchFamily="34" charset="0"/>
-              <a:cs typeface="Arial" panose="020B0604020202020204" pitchFamily="34" charset="0"/>
-            </a:endParaRPr>
+              <a:t>, WebPKI.org, V0.99, 2015-04-28</a:t>
+            </a:r>
           </a:p>
         </p:txBody>
       </p:sp>
@@ -4125,12 +4114,26 @@
                 <a:latin typeface="Arial" panose="020B0604020202020204" pitchFamily="34" charset="0"/>
                 <a:cs typeface="Arial" panose="020B0604020202020204" pitchFamily="34" charset="0"/>
               </a:rPr>
-              <a:t>This proposal is a enhanced version of </a:t>
+              <a:t>This proposal is </a:t>
             </a:r>
             <a:r>
               <a:rPr lang="en-US" sz="1600" dirty="0" smtClean="0">
                 <a:latin typeface="Arial" panose="020B0604020202020204" pitchFamily="34" charset="0"/>
                 <a:cs typeface="Arial" panose="020B0604020202020204" pitchFamily="34" charset="0"/>
+              </a:rPr>
+              <a:t>an </a:t>
+            </a:r>
+            <a:r>
+              <a:rPr lang="en-US" sz="1600" dirty="0" smtClean="0">
+                <a:latin typeface="Arial" panose="020B0604020202020204" pitchFamily="34" charset="0"/>
+                <a:cs typeface="Arial" panose="020B0604020202020204" pitchFamily="34" charset="0"/>
+              </a:rPr>
+              <a:t>enhanced version of </a:t>
+            </a:r>
+            <a:r>
+              <a:rPr lang="en-US" sz="1400" dirty="0" smtClean="0">
+                <a:latin typeface="Arial" panose="020B0604020202020204" pitchFamily="34" charset="0"/>
+                <a:cs typeface="Arial" panose="020B0604020202020204" pitchFamily="34" charset="0"/>
                 <a:hlinkClick r:id="rId2" action="ppaction://hlinksldjump"/>
               </a:rPr>
               <a:t>Chrome’s Native Messaging</a:t>
@@ -4142,10 +4145,6 @@
               </a:rPr>
               <a:t>.</a:t>
             </a:r>
-            <a:endParaRPr lang="en-US" sz="1600" dirty="0" smtClean="0">
-              <a:latin typeface="Arial" panose="020B0604020202020204" pitchFamily="34" charset="0"/>
-              <a:cs typeface="Arial" panose="020B0604020202020204" pitchFamily="34" charset="0"/>
-            </a:endParaRPr>
           </a:p>
         </p:txBody>
       </p:sp>
@@ -12521,14 +12520,7 @@
                 <a:latin typeface="Arial" panose="020B0604020202020204" pitchFamily="34" charset="0"/>
                 <a:cs typeface="Arial" panose="020B0604020202020204" pitchFamily="34" charset="0"/>
               </a:rPr>
-              <a:t>Channel </a:t>
-            </a:r>
-            <a:r>
-              <a:rPr lang="en-US" sz="1400" dirty="0" smtClean="0">
-                <a:latin typeface="Arial" panose="020B0604020202020204" pitchFamily="34" charset="0"/>
-                <a:cs typeface="Arial" panose="020B0604020202020204" pitchFamily="34" charset="0"/>
-              </a:rPr>
-              <a:t>API.  Most likely modelled after </a:t>
+              <a:t>Channel API.  Most likely modelled after </a:t>
             </a:r>
             <a:r>
               <a:rPr lang="en-US" sz="1400" dirty="0" smtClean="0">

</xml_diff>